<commit_message>
Ajustes a la presentación
</commit_message>
<xml_diff>
--- a/Modelo_Clasificacion_Desviaciones_V1.pptx
+++ b/Modelo_Clasificacion_Desviaciones_V1.pptx
@@ -6,23 +6,22 @@
   </p:sldMasterIdLst>
   <p:sldIdLst>
     <p:sldId id="270" r:id="rId2"/>
-    <p:sldId id="260" r:id="rId3"/>
-    <p:sldId id="271" r:id="rId4"/>
+    <p:sldId id="271" r:id="rId3"/>
+    <p:sldId id="260" r:id="rId4"/>
     <p:sldId id="272" r:id="rId5"/>
-    <p:sldId id="273" r:id="rId6"/>
-    <p:sldId id="274" r:id="rId7"/>
-    <p:sldId id="275" r:id="rId8"/>
-    <p:sldId id="276" r:id="rId9"/>
-    <p:sldId id="277" r:id="rId10"/>
-    <p:sldId id="278" r:id="rId11"/>
-    <p:sldId id="279" r:id="rId12"/>
-    <p:sldId id="280" r:id="rId13"/>
-    <p:sldId id="266" r:id="rId14"/>
-    <p:sldId id="281" r:id="rId15"/>
-    <p:sldId id="282" r:id="rId16"/>
-    <p:sldId id="283" r:id="rId17"/>
-    <p:sldId id="284" r:id="rId18"/>
-    <p:sldId id="268" r:id="rId19"/>
+    <p:sldId id="274" r:id="rId6"/>
+    <p:sldId id="275" r:id="rId7"/>
+    <p:sldId id="276" r:id="rId8"/>
+    <p:sldId id="277" r:id="rId9"/>
+    <p:sldId id="278" r:id="rId10"/>
+    <p:sldId id="279" r:id="rId11"/>
+    <p:sldId id="280" r:id="rId12"/>
+    <p:sldId id="266" r:id="rId13"/>
+    <p:sldId id="281" r:id="rId14"/>
+    <p:sldId id="282" r:id="rId15"/>
+    <p:sldId id="283" r:id="rId16"/>
+    <p:sldId id="284" r:id="rId17"/>
+    <p:sldId id="268" r:id="rId18"/>
   </p:sldIdLst>
   <p:sldSz cx="9144000" cy="6858000" type="screen4x3"/>
   <p:notesSz cx="6858000" cy="9144000"/>
@@ -3493,6 +3492,15 @@
               <a:endParaRPr lang="es-CO"/>
             </a:p>
           </c:txPr>
+          <c:showLegendKey val="1"/>
+          <c:showVal val="1"/>
+          <c:showCatName val="1"/>
+          <c:showSerName val="1"/>
+          <c:showPercent val="1"/>
+          <c:showBubbleSize val="1"/>
+          <c:extLst>
+            <c:ext xmlns:c15="http://schemas.microsoft.com/office/drawing/2012/chart" uri="{CE6537A1-D6FC-4f65-9D91-7224C49458BB}"/>
+          </c:extLst>
         </c:dLbl>
       </c:pivotFmt>
       <c:pivotFmt>
@@ -3577,6 +3585,15 @@
               <a:endParaRPr lang="es-CO"/>
             </a:p>
           </c:txPr>
+          <c:showLegendKey val="1"/>
+          <c:showVal val="1"/>
+          <c:showCatName val="1"/>
+          <c:showSerName val="1"/>
+          <c:showPercent val="1"/>
+          <c:showBubbleSize val="1"/>
+          <c:extLst>
+            <c:ext xmlns:c15="http://schemas.microsoft.com/office/drawing/2012/chart" uri="{CE6537A1-D6FC-4f65-9D91-7224C49458BB}"/>
+          </c:extLst>
         </c:dLbl>
       </c:pivotFmt>
       <c:pivotFmt>
@@ -3661,6 +3678,15 @@
               <a:endParaRPr lang="es-CO"/>
             </a:p>
           </c:txPr>
+          <c:showLegendKey val="1"/>
+          <c:showVal val="1"/>
+          <c:showCatName val="1"/>
+          <c:showSerName val="1"/>
+          <c:showPercent val="1"/>
+          <c:showBubbleSize val="1"/>
+          <c:extLst>
+            <c:ext xmlns:c15="http://schemas.microsoft.com/office/drawing/2012/chart" uri="{CE6537A1-D6FC-4f65-9D91-7224C49458BB}"/>
+          </c:extLst>
         </c:dLbl>
       </c:pivotFmt>
       <c:pivotFmt>
@@ -15408,547 +15434,6 @@
       </p:grpSpPr>
       <p:sp>
         <p:nvSpPr>
-          <p:cNvPr id="2" name="Título 1">
-            <a:extLst>
-              <a:ext uri="{FF2B5EF4-FFF2-40B4-BE49-F238E27FC236}">
-                <a16:creationId xmlns:a16="http://schemas.microsoft.com/office/drawing/2014/main" id="{7F63C47A-318B-4D5D-0166-313320578154}"/>
-              </a:ext>
-            </a:extLst>
-          </p:cNvPr>
-          <p:cNvSpPr>
-            <a:spLocks noGrp="1"/>
-          </p:cNvSpPr>
-          <p:nvPr>
-            <p:ph type="ctrTitle"/>
-          </p:nvPr>
-        </p:nvSpPr>
-        <p:spPr>
-          <a:xfrm>
-            <a:off x="685800" y="761099"/>
-            <a:ext cx="7772400" cy="388840"/>
-          </a:xfrm>
-        </p:spPr>
-        <p:txBody>
-          <a:bodyPr>
-            <a:noAutofit/>
-          </a:bodyPr>
-          <a:lstStyle/>
-          <a:p>
-            <a:r>
-              <a:rPr lang="es-CO" sz="2800" b="1" dirty="0"/>
-              <a:t>Entrenamiento del modelo </a:t>
-            </a:r>
-            <a:r>
-              <a:rPr lang="es-CO" sz="2800" b="1" dirty="0" err="1">
-                <a:solidFill>
-                  <a:schemeClr val="tx1"/>
-                </a:solidFill>
-              </a:rPr>
-              <a:t>Random</a:t>
-            </a:r>
-            <a:r>
-              <a:rPr lang="es-CO" sz="2800" b="1" dirty="0">
-                <a:solidFill>
-                  <a:schemeClr val="tx1"/>
-                </a:solidFill>
-              </a:rPr>
-              <a:t> Forest</a:t>
-            </a:r>
-            <a:r>
-              <a:rPr lang="es-CO" sz="2800" b="1" dirty="0"/>
-              <a:t>.</a:t>
-            </a:r>
-          </a:p>
-        </p:txBody>
-      </p:sp>
-      <p:sp>
-        <p:nvSpPr>
-          <p:cNvPr id="3" name="Subtítulo 2">
-            <a:extLst>
-              <a:ext uri="{FF2B5EF4-FFF2-40B4-BE49-F238E27FC236}">
-                <a16:creationId xmlns:a16="http://schemas.microsoft.com/office/drawing/2014/main" id="{F4A8B6A1-7D37-A5AE-1FE4-497728A76C56}"/>
-              </a:ext>
-            </a:extLst>
-          </p:cNvPr>
-          <p:cNvSpPr>
-            <a:spLocks noGrp="1"/>
-          </p:cNvSpPr>
-          <p:nvPr>
-            <p:ph type="subTitle" idx="1"/>
-          </p:nvPr>
-        </p:nvSpPr>
-        <p:spPr>
-          <a:xfrm>
-            <a:off x="951722" y="1327778"/>
-            <a:ext cx="6820678" cy="4326574"/>
-          </a:xfrm>
-        </p:spPr>
-        <p:txBody>
-          <a:bodyPr>
-            <a:normAutofit/>
-          </a:bodyPr>
-          <a:lstStyle/>
-          <a:p>
-            <a:pPr algn="l"/>
-            <a:r>
-              <a:rPr lang="es-CO" sz="1400" dirty="0">
-                <a:solidFill>
-                  <a:schemeClr val="tx1"/>
-                </a:solidFill>
-              </a:rPr>
-              <a:t>70% datos de Train</a:t>
-            </a:r>
-          </a:p>
-          <a:p>
-            <a:pPr algn="l"/>
-            <a:r>
-              <a:rPr lang="es-CO" sz="1400" dirty="0">
-                <a:solidFill>
-                  <a:schemeClr val="tx1"/>
-                </a:solidFill>
-              </a:rPr>
-              <a:t>15% datos de Test</a:t>
-            </a:r>
-          </a:p>
-          <a:p>
-            <a:pPr algn="l"/>
-            <a:r>
-              <a:rPr lang="es-CO" sz="1400" dirty="0">
-                <a:solidFill>
-                  <a:schemeClr val="tx1"/>
-                </a:solidFill>
-              </a:rPr>
-              <a:t>15% datos de Validación</a:t>
-            </a:r>
-          </a:p>
-          <a:p>
-            <a:pPr algn="l"/>
-            <a:endParaRPr lang="es-CO" sz="1400" dirty="0">
-              <a:solidFill>
-                <a:schemeClr val="tx1"/>
-              </a:solidFill>
-            </a:endParaRPr>
-          </a:p>
-          <a:p>
-            <a:pPr algn="l"/>
-            <a:endParaRPr lang="es-CO" sz="1400" dirty="0">
-              <a:solidFill>
-                <a:schemeClr val="tx1"/>
-              </a:solidFill>
-            </a:endParaRPr>
-          </a:p>
-          <a:p>
-            <a:pPr algn="l"/>
-            <a:r>
-              <a:rPr lang="es-CO" sz="1400" dirty="0">
-                <a:solidFill>
-                  <a:schemeClr val="tx1"/>
-                </a:solidFill>
-              </a:rPr>
-              <a:t>Datos de Test</a:t>
-            </a:r>
-          </a:p>
-          <a:p>
-            <a:pPr algn="l"/>
-            <a:r>
-              <a:rPr lang="es-ES" sz="1400" dirty="0">
-                <a:solidFill>
-                  <a:schemeClr val="tx1"/>
-                </a:solidFill>
-              </a:rPr>
-              <a:t>- </a:t>
-            </a:r>
-            <a:r>
-              <a:rPr lang="es-ES" sz="1400" dirty="0" err="1">
-                <a:solidFill>
-                  <a:schemeClr val="tx1"/>
-                </a:solidFill>
-              </a:rPr>
-              <a:t>Accuracy</a:t>
-            </a:r>
-            <a:r>
-              <a:rPr lang="es-ES" sz="1400" dirty="0">
-                <a:solidFill>
-                  <a:schemeClr val="tx1"/>
-                </a:solidFill>
-              </a:rPr>
-              <a:t>: 85.26%</a:t>
-            </a:r>
-          </a:p>
-          <a:p>
-            <a:pPr algn="l"/>
-            <a:r>
-              <a:rPr lang="es-ES" sz="1400" dirty="0">
-                <a:solidFill>
-                  <a:schemeClr val="tx1"/>
-                </a:solidFill>
-              </a:rPr>
-              <a:t>- F1 Score: 88.94%</a:t>
-            </a:r>
-          </a:p>
-          <a:p>
-            <a:pPr algn="l"/>
-            <a:endParaRPr lang="es-ES" sz="1400" dirty="0">
-              <a:solidFill>
-                <a:schemeClr val="tx1"/>
-              </a:solidFill>
-            </a:endParaRPr>
-          </a:p>
-          <a:p>
-            <a:pPr algn="l"/>
-            <a:endParaRPr lang="es-ES" sz="1400" dirty="0">
-              <a:solidFill>
-                <a:schemeClr val="tx1"/>
-              </a:solidFill>
-            </a:endParaRPr>
-          </a:p>
-          <a:p>
-            <a:pPr algn="l"/>
-            <a:endParaRPr lang="es-ES" sz="1400" dirty="0">
-              <a:solidFill>
-                <a:schemeClr val="tx1"/>
-              </a:solidFill>
-            </a:endParaRPr>
-          </a:p>
-          <a:p>
-            <a:pPr algn="l"/>
-            <a:r>
-              <a:rPr lang="es-ES" sz="1400" dirty="0">
-                <a:solidFill>
-                  <a:schemeClr val="tx1"/>
-                </a:solidFill>
-              </a:rPr>
-              <a:t>Los resultados son positivos, especialmente en el F1 Score, que es la métrica más relevante en este caso por el desbalance moderado entre clases.</a:t>
-            </a:r>
-          </a:p>
-          <a:p>
-            <a:pPr algn="l"/>
-            <a:endParaRPr lang="es-ES" sz="1600" dirty="0">
-              <a:solidFill>
-                <a:schemeClr val="tx1"/>
-              </a:solidFill>
-            </a:endParaRPr>
-          </a:p>
-          <a:p>
-            <a:pPr algn="l"/>
-            <a:endParaRPr lang="es-CO" sz="1600" dirty="0">
-              <a:solidFill>
-                <a:schemeClr val="tx1"/>
-              </a:solidFill>
-            </a:endParaRPr>
-          </a:p>
-        </p:txBody>
-      </p:sp>
-      <p:pic>
-        <p:nvPicPr>
-          <p:cNvPr id="4" name="Picture 2" descr="Universidad de Medellín - Universidad de Medellín">
-            <a:extLst>
-              <a:ext uri="{FF2B5EF4-FFF2-40B4-BE49-F238E27FC236}">
-                <a16:creationId xmlns:a16="http://schemas.microsoft.com/office/drawing/2014/main" id="{55CFFF9E-3355-1C5B-5E6B-D4FD351B2F1C}"/>
-              </a:ext>
-            </a:extLst>
-          </p:cNvPr>
-          <p:cNvPicPr>
-            <a:picLocks noChangeAspect="1" noChangeArrowheads="1"/>
-          </p:cNvPicPr>
-          <p:nvPr/>
-        </p:nvPicPr>
-        <p:blipFill>
-          <a:blip r:embed="rId2">
-            <a:extLst>
-              <a:ext uri="{28A0092B-C50C-407E-A947-70E740481C1C}">
-                <a14:useLocalDpi xmlns:a14="http://schemas.microsoft.com/office/drawing/2010/main" val="0"/>
-              </a:ext>
-            </a:extLst>
-          </a:blip>
-          <a:srcRect/>
-          <a:stretch>
-            <a:fillRect/>
-          </a:stretch>
-        </p:blipFill>
-        <p:spPr bwMode="auto">
-          <a:xfrm>
-            <a:off x="1" y="1"/>
-            <a:ext cx="2136710" cy="761098"/>
-          </a:xfrm>
-          <a:prstGeom prst="rect">
-            <a:avLst/>
-          </a:prstGeom>
-          <a:noFill/>
-          <a:extLst>
-            <a:ext uri="{909E8E84-426E-40DD-AFC4-6F175D3DCCD1}">
-              <a14:hiddenFill xmlns:a14="http://schemas.microsoft.com/office/drawing/2010/main">
-                <a:solidFill>
-                  <a:srgbClr val="FFFFFF"/>
-                </a:solidFill>
-              </a14:hiddenFill>
-            </a:ext>
-          </a:extLst>
-        </p:spPr>
-      </p:pic>
-      <p:pic>
-        <p:nvPicPr>
-          <p:cNvPr id="6" name="Imagen 5">
-            <a:extLst>
-              <a:ext uri="{FF2B5EF4-FFF2-40B4-BE49-F238E27FC236}">
-                <a16:creationId xmlns:a16="http://schemas.microsoft.com/office/drawing/2014/main" id="{CBCFAF55-1E87-0658-B0A0-FB0F0AE34263}"/>
-              </a:ext>
-            </a:extLst>
-          </p:cNvPr>
-          <p:cNvPicPr>
-            <a:picLocks noChangeAspect="1"/>
-          </p:cNvPicPr>
-          <p:nvPr/>
-        </p:nvPicPr>
-        <p:blipFill>
-          <a:blip r:embed="rId3"/>
-          <a:stretch>
-            <a:fillRect/>
-          </a:stretch>
-        </p:blipFill>
-        <p:spPr>
-          <a:xfrm>
-            <a:off x="3396343" y="1327778"/>
-            <a:ext cx="4049486" cy="2659806"/>
-          </a:xfrm>
-          <a:prstGeom prst="rect">
-            <a:avLst/>
-          </a:prstGeom>
-        </p:spPr>
-      </p:pic>
-      <p:graphicFrame>
-        <p:nvGraphicFramePr>
-          <p:cNvPr id="7" name="Tabla 6">
-            <a:extLst>
-              <a:ext uri="{FF2B5EF4-FFF2-40B4-BE49-F238E27FC236}">
-                <a16:creationId xmlns:a16="http://schemas.microsoft.com/office/drawing/2014/main" id="{1F25265C-5805-DD36-4E0F-C1A26D69C82C}"/>
-              </a:ext>
-            </a:extLst>
-          </p:cNvPr>
-          <p:cNvGraphicFramePr>
-            <a:graphicFrameLocks noGrp="1"/>
-          </p:cNvGraphicFramePr>
-          <p:nvPr>
-            <p:extLst>
-              <p:ext uri="{D42A27DB-BD31-4B8C-83A1-F6EECF244321}">
-                <p14:modId xmlns:p14="http://schemas.microsoft.com/office/powerpoint/2010/main" val="3070534253"/>
-              </p:ext>
-            </p:extLst>
-          </p:nvPr>
-        </p:nvGraphicFramePr>
-        <p:xfrm>
-          <a:off x="1007705" y="4831392"/>
-          <a:ext cx="6596744" cy="822960"/>
-        </p:xfrm>
-        <a:graphic>
-          <a:graphicData uri="http://schemas.openxmlformats.org/drawingml/2006/table">
-            <a:tbl>
-              <a:tblPr firstRow="1" bandRow="1">
-                <a:tableStyleId>{5C22544A-7EE6-4342-B048-85BDC9FD1C3A}</a:tableStyleId>
-              </a:tblPr>
-              <a:tblGrid>
-                <a:gridCol w="1603312">
-                  <a:extLst>
-                    <a:ext uri="{9D8B030D-6E8A-4147-A177-3AD203B41FA5}">
-                      <a16:colId xmlns:a16="http://schemas.microsoft.com/office/drawing/2014/main" val="3359673869"/>
-                    </a:ext>
-                  </a:extLst>
-                </a:gridCol>
-                <a:gridCol w="2011108">
-                  <a:extLst>
-                    <a:ext uri="{9D8B030D-6E8A-4147-A177-3AD203B41FA5}">
-                      <a16:colId xmlns:a16="http://schemas.microsoft.com/office/drawing/2014/main" val="4013225091"/>
-                    </a:ext>
-                  </a:extLst>
-                </a:gridCol>
-                <a:gridCol w="2982324">
-                  <a:extLst>
-                    <a:ext uri="{9D8B030D-6E8A-4147-A177-3AD203B41FA5}">
-                      <a16:colId xmlns:a16="http://schemas.microsoft.com/office/drawing/2014/main" val="837407753"/>
-                    </a:ext>
-                  </a:extLst>
-                </a:gridCol>
-              </a:tblGrid>
-              <a:tr h="0">
-                <a:tc>
-                  <a:txBody>
-                    <a:bodyPr/>
-                    <a:lstStyle/>
-                    <a:p>
-                      <a:pPr algn="ctr"/>
-                      <a:endParaRPr lang="es-CO" sz="1200" dirty="0"/>
-                    </a:p>
-                  </a:txBody>
-                  <a:tcPr/>
-                </a:tc>
-                <a:tc>
-                  <a:txBody>
-                    <a:bodyPr/>
-                    <a:lstStyle/>
-                    <a:p>
-                      <a:pPr algn="ctr"/>
-                      <a:r>
-                        <a:rPr lang="es-CO" sz="1200" dirty="0"/>
-                        <a:t>Predicción: No acción (0)</a:t>
-                      </a:r>
-                    </a:p>
-                  </a:txBody>
-                  <a:tcPr/>
-                </a:tc>
-                <a:tc>
-                  <a:txBody>
-                    <a:bodyPr/>
-                    <a:lstStyle/>
-                    <a:p>
-                      <a:pPr algn="ctr"/>
-                      <a:r>
-                        <a:rPr lang="es-CO" sz="1200" dirty="0"/>
-                        <a:t>Predicción: Acción (1)</a:t>
-                      </a:r>
-                    </a:p>
-                  </a:txBody>
-                  <a:tcPr/>
-                </a:tc>
-                <a:extLst>
-                  <a:ext uri="{0D108BD9-81ED-4DB2-BD59-A6C34878D82A}">
-                    <a16:rowId xmlns:a16="http://schemas.microsoft.com/office/drawing/2014/main" val="2252421095"/>
-                  </a:ext>
-                </a:extLst>
-              </a:tr>
-              <a:tr h="152752">
-                <a:tc>
-                  <a:txBody>
-                    <a:bodyPr/>
-                    <a:lstStyle/>
-                    <a:p>
-                      <a:pPr algn="ctr"/>
-                      <a:r>
-                        <a:rPr lang="es-CO" sz="1200" dirty="0"/>
-                        <a:t>Analista: No acción (0)</a:t>
-                      </a:r>
-                    </a:p>
-                  </a:txBody>
-                  <a:tcPr/>
-                </a:tc>
-                <a:tc>
-                  <a:txBody>
-                    <a:bodyPr/>
-                    <a:lstStyle/>
-                    <a:p>
-                      <a:pPr algn="ctr"/>
-                      <a:r>
-                        <a:rPr lang="es-CO" sz="1200" dirty="0"/>
-                        <a:t>3,351 (verdaderos negativos)</a:t>
-                      </a:r>
-                    </a:p>
-                  </a:txBody>
-                  <a:tcPr/>
-                </a:tc>
-                <a:tc>
-                  <a:txBody>
-                    <a:bodyPr/>
-                    <a:lstStyle/>
-                    <a:p>
-                      <a:pPr algn="ctr"/>
-                      <a:r>
-                        <a:rPr lang="es-CO" sz="1200" dirty="0"/>
-                        <a:t>1,028 (falsos positivos)</a:t>
-                      </a:r>
-                    </a:p>
-                  </a:txBody>
-                  <a:tcPr/>
-                </a:tc>
-                <a:extLst>
-                  <a:ext uri="{0D108BD9-81ED-4DB2-BD59-A6C34878D82A}">
-                    <a16:rowId xmlns:a16="http://schemas.microsoft.com/office/drawing/2014/main" val="3913384185"/>
-                  </a:ext>
-                </a:extLst>
-              </a:tr>
-              <a:tr h="0">
-                <a:tc>
-                  <a:txBody>
-                    <a:bodyPr/>
-                    <a:lstStyle/>
-                    <a:p>
-                      <a:pPr algn="ctr"/>
-                      <a:r>
-                        <a:rPr lang="es-CO" sz="1200" dirty="0"/>
-                        <a:t>Analista: Acción (1)</a:t>
-                      </a:r>
-                    </a:p>
-                  </a:txBody>
-                  <a:tcPr/>
-                </a:tc>
-                <a:tc>
-                  <a:txBody>
-                    <a:bodyPr/>
-                    <a:lstStyle/>
-                    <a:p>
-                      <a:pPr algn="ctr"/>
-                      <a:r>
-                        <a:rPr lang="es-CO" sz="1200" dirty="0"/>
-                        <a:t>869 (falsos negativos)</a:t>
-                      </a:r>
-                    </a:p>
-                  </a:txBody>
-                  <a:tcPr/>
-                </a:tc>
-                <a:tc>
-                  <a:txBody>
-                    <a:bodyPr/>
-                    <a:lstStyle/>
-                    <a:p>
-                      <a:pPr algn="ctr"/>
-                      <a:r>
-                        <a:rPr lang="es-CO" sz="1200" dirty="0"/>
-                        <a:t>7,624 (verdaderos positivos)</a:t>
-                      </a:r>
-                    </a:p>
-                  </a:txBody>
-                  <a:tcPr/>
-                </a:tc>
-                <a:extLst>
-                  <a:ext uri="{0D108BD9-81ED-4DB2-BD59-A6C34878D82A}">
-                    <a16:rowId xmlns:a16="http://schemas.microsoft.com/office/drawing/2014/main" val="472616589"/>
-                  </a:ext>
-                </a:extLst>
-              </a:tr>
-            </a:tbl>
-          </a:graphicData>
-        </a:graphic>
-      </p:graphicFrame>
-    </p:spTree>
-    <p:extLst>
-      <p:ext uri="{BB962C8B-B14F-4D97-AF65-F5344CB8AC3E}">
-        <p14:creationId xmlns:p14="http://schemas.microsoft.com/office/powerpoint/2010/main" val="1155662811"/>
-      </p:ext>
-    </p:extLst>
-  </p:cSld>
-  <p:clrMapOvr>
-    <a:masterClrMapping/>
-  </p:clrMapOvr>
-</p:sld>
-</file>
-
-<file path=ppt/slides/slide11.xml><?xml version="1.0" encoding="utf-8"?>
-<p:sld xmlns:a="http://schemas.openxmlformats.org/drawingml/2006/main" xmlns:r="http://schemas.openxmlformats.org/officeDocument/2006/relationships" xmlns:p="http://schemas.openxmlformats.org/presentationml/2006/main">
-  <p:cSld>
-    <p:spTree>
-      <p:nvGrpSpPr>
-        <p:cNvPr id="1" name=""/>
-        <p:cNvGrpSpPr/>
-        <p:nvPr/>
-      </p:nvGrpSpPr>
-      <p:grpSpPr>
-        <a:xfrm>
-          <a:off x="0" y="0"/>
-          <a:ext cx="0" cy="0"/>
-          <a:chOff x="0" y="0"/>
-          <a:chExt cx="0" cy="0"/>
-        </a:xfrm>
-      </p:grpSpPr>
-      <p:sp>
-        <p:nvSpPr>
           <p:cNvPr id="3" name="Subtítulo 2">
             <a:extLst>
               <a:ext uri="{FF2B5EF4-FFF2-40B4-BE49-F238E27FC236}">
@@ -16296,7 +15781,7 @@
 </p:sld>
 </file>
 
-<file path=ppt/slides/slide12.xml><?xml version="1.0" encoding="utf-8"?>
+<file path=ppt/slides/slide11.xml><?xml version="1.0" encoding="utf-8"?>
 <p:sld xmlns:a="http://schemas.openxmlformats.org/drawingml/2006/main" xmlns:r="http://schemas.openxmlformats.org/officeDocument/2006/relationships" xmlns:p="http://schemas.openxmlformats.org/presentationml/2006/main">
   <p:cSld>
     <p:spTree>
@@ -16640,7 +16125,7 @@
 </p:sld>
 </file>
 
-<file path=ppt/slides/slide13.xml><?xml version="1.0" encoding="utf-8"?>
+<file path=ppt/slides/slide12.xml><?xml version="1.0" encoding="utf-8"?>
 <p:sld xmlns:a="http://schemas.openxmlformats.org/drawingml/2006/main" xmlns:r="http://schemas.openxmlformats.org/officeDocument/2006/relationships" xmlns:p="http://schemas.openxmlformats.org/presentationml/2006/main">
   <p:cSld>
     <p:spTree>
@@ -17801,7 +17286,7 @@
 </p:sld>
 </file>
 
-<file path=ppt/slides/slide14.xml><?xml version="1.0" encoding="utf-8"?>
+<file path=ppt/slides/slide13.xml><?xml version="1.0" encoding="utf-8"?>
 <p:sld xmlns:a="http://schemas.openxmlformats.org/drawingml/2006/main" xmlns:r="http://schemas.openxmlformats.org/officeDocument/2006/relationships" xmlns:p="http://schemas.openxmlformats.org/presentationml/2006/main">
   <p:cSld>
     <p:spTree>
@@ -18266,7 +17751,7 @@
 </p:sld>
 </file>
 
-<file path=ppt/slides/slide15.xml><?xml version="1.0" encoding="utf-8"?>
+<file path=ppt/slides/slide14.xml><?xml version="1.0" encoding="utf-8"?>
 <p:sld xmlns:a="http://schemas.openxmlformats.org/drawingml/2006/main" xmlns:r="http://schemas.openxmlformats.org/officeDocument/2006/relationships" xmlns:p="http://schemas.openxmlformats.org/presentationml/2006/main">
   <p:cSld>
     <p:spTree>
@@ -18513,7 +17998,7 @@
 </p:sld>
 </file>
 
-<file path=ppt/slides/slide16.xml><?xml version="1.0" encoding="utf-8"?>
+<file path=ppt/slides/slide15.xml><?xml version="1.0" encoding="utf-8"?>
 <p:sld xmlns:a="http://schemas.openxmlformats.org/drawingml/2006/main" xmlns:r="http://schemas.openxmlformats.org/officeDocument/2006/relationships" xmlns:p="http://schemas.openxmlformats.org/presentationml/2006/main">
   <p:cSld>
     <p:spTree>
@@ -18723,7 +18208,7 @@
           <p:nvPr>
             <p:extLst>
               <p:ext uri="{D42A27DB-BD31-4B8C-83A1-F6EECF244321}">
-                <p14:modId xmlns:p14="http://schemas.microsoft.com/office/powerpoint/2010/main" val="4168228773"/>
+                <p14:modId xmlns:p14="http://schemas.microsoft.com/office/powerpoint/2010/main" val="1617529229"/>
               </p:ext>
             </p:extLst>
           </p:nvPr>
@@ -18875,7 +18360,13 @@
                       </a:r>
                     </a:p>
                   </a:txBody>
-                  <a:tcPr/>
+                  <a:tcPr>
+                    <a:solidFill>
+                      <a:schemeClr val="bg2">
+                        <a:lumMod val="90000"/>
+                      </a:schemeClr>
+                    </a:solidFill>
+                  </a:tcPr>
                 </a:tc>
                 <a:tc>
                   <a:txBody>
@@ -18894,7 +18385,13 @@
                       </a:endParaRPr>
                     </a:p>
                   </a:txBody>
-                  <a:tcPr/>
+                  <a:tcPr>
+                    <a:solidFill>
+                      <a:schemeClr val="bg2">
+                        <a:lumMod val="90000"/>
+                      </a:schemeClr>
+                    </a:solidFill>
+                  </a:tcPr>
                 </a:tc>
                 <a:tc>
                   <a:txBody>
@@ -18910,7 +18407,13 @@
                       </a:r>
                     </a:p>
                   </a:txBody>
-                  <a:tcPr/>
+                  <a:tcPr>
+                    <a:solidFill>
+                      <a:schemeClr val="bg2">
+                        <a:lumMod val="90000"/>
+                      </a:schemeClr>
+                    </a:solidFill>
+                  </a:tcPr>
                 </a:tc>
                 <a:tc>
                   <a:txBody>
@@ -18926,7 +18429,13 @@
                       </a:r>
                     </a:p>
                   </a:txBody>
-                  <a:tcPr/>
+                  <a:tcPr>
+                    <a:solidFill>
+                      <a:schemeClr val="bg2">
+                        <a:lumMod val="90000"/>
+                      </a:schemeClr>
+                    </a:solidFill>
+                  </a:tcPr>
                 </a:tc>
                 <a:extLst>
                   <a:ext uri="{0D108BD9-81ED-4DB2-BD59-A6C34878D82A}">
@@ -19381,7 +18890,13 @@
                       </a:r>
                     </a:p>
                   </a:txBody>
-                  <a:tcPr/>
+                  <a:tcPr>
+                    <a:solidFill>
+                      <a:schemeClr val="bg2">
+                        <a:lumMod val="90000"/>
+                      </a:schemeClr>
+                    </a:solidFill>
+                  </a:tcPr>
                 </a:tc>
                 <a:tc>
                   <a:txBody>
@@ -19397,7 +18912,13 @@
                       </a:r>
                     </a:p>
                   </a:txBody>
-                  <a:tcPr/>
+                  <a:tcPr>
+                    <a:solidFill>
+                      <a:schemeClr val="bg2">
+                        <a:lumMod val="90000"/>
+                      </a:schemeClr>
+                    </a:solidFill>
+                  </a:tcPr>
                 </a:tc>
                 <a:tc>
                   <a:txBody>
@@ -19413,7 +18934,13 @@
                       </a:r>
                     </a:p>
                   </a:txBody>
-                  <a:tcPr/>
+                  <a:tcPr>
+                    <a:solidFill>
+                      <a:schemeClr val="bg2">
+                        <a:lumMod val="90000"/>
+                      </a:schemeClr>
+                    </a:solidFill>
+                  </a:tcPr>
                 </a:tc>
                 <a:tc>
                   <a:txBody>
@@ -19429,7 +18956,13 @@
                       </a:r>
                     </a:p>
                   </a:txBody>
-                  <a:tcPr/>
+                  <a:tcPr>
+                    <a:solidFill>
+                      <a:schemeClr val="bg2">
+                        <a:lumMod val="90000"/>
+                      </a:schemeClr>
+                    </a:solidFill>
+                  </a:tcPr>
                 </a:tc>
                 <a:extLst>
                   <a:ext uri="{0D108BD9-81ED-4DB2-BD59-A6C34878D82A}">
@@ -19765,7 +19298,7 @@
 </p:sld>
 </file>
 
-<file path=ppt/slides/slide17.xml><?xml version="1.0" encoding="utf-8"?>
+<file path=ppt/slides/slide16.xml><?xml version="1.0" encoding="utf-8"?>
 <p:sld xmlns:a="http://schemas.openxmlformats.org/drawingml/2006/main" xmlns:r="http://schemas.openxmlformats.org/officeDocument/2006/relationships" xmlns:p="http://schemas.openxmlformats.org/presentationml/2006/main">
   <p:cSld>
     <p:spTree>
@@ -20112,7 +19645,7 @@
 </p:sld>
 </file>
 
-<file path=ppt/slides/slide18.xml><?xml version="1.0" encoding="utf-8"?>
+<file path=ppt/slides/slide17.xml><?xml version="1.0" encoding="utf-8"?>
 <p:sld xmlns:a="http://schemas.openxmlformats.org/drawingml/2006/main" xmlns:r="http://schemas.openxmlformats.org/officeDocument/2006/relationships" xmlns:p="http://schemas.openxmlformats.org/presentationml/2006/main">
   <p:cSld>
     <p:spTree>
@@ -20318,6 +19851,202 @@
   <p:cSld>
     <p:spTree>
       <p:nvGrpSpPr>
+        <p:cNvPr id="1" name=""/>
+        <p:cNvGrpSpPr/>
+        <p:nvPr/>
+      </p:nvGrpSpPr>
+      <p:grpSpPr>
+        <a:xfrm>
+          <a:off x="0" y="0"/>
+          <a:ext cx="0" cy="0"/>
+          <a:chOff x="0" y="0"/>
+          <a:chExt cx="0" cy="0"/>
+        </a:xfrm>
+      </p:grpSpPr>
+      <p:sp>
+        <p:nvSpPr>
+          <p:cNvPr id="2" name="Título 1">
+            <a:extLst>
+              <a:ext uri="{FF2B5EF4-FFF2-40B4-BE49-F238E27FC236}">
+                <a16:creationId xmlns:a16="http://schemas.microsoft.com/office/drawing/2014/main" id="{0A1DA919-2214-A080-682F-35C5CD13B58D}"/>
+              </a:ext>
+            </a:extLst>
+          </p:cNvPr>
+          <p:cNvSpPr>
+            <a:spLocks noGrp="1"/>
+          </p:cNvSpPr>
+          <p:nvPr>
+            <p:ph type="ctrTitle"/>
+          </p:nvPr>
+        </p:nvSpPr>
+        <p:spPr>
+          <a:xfrm>
+            <a:off x="685800" y="814810"/>
+            <a:ext cx="7772400" cy="752734"/>
+          </a:xfrm>
+        </p:spPr>
+        <p:txBody>
+          <a:bodyPr>
+            <a:normAutofit fontScale="90000"/>
+          </a:bodyPr>
+          <a:lstStyle/>
+          <a:p>
+            <a:r>
+              <a:rPr lang="es-CO" b="1">
+                <a:effectLst/>
+              </a:rPr>
+              <a:t>Contexto del Proyecto</a:t>
+            </a:r>
+            <a:endParaRPr lang="es-CO" dirty="0"/>
+          </a:p>
+        </p:txBody>
+      </p:sp>
+      <p:sp>
+        <p:nvSpPr>
+          <p:cNvPr id="3" name="Subtítulo 2">
+            <a:extLst>
+              <a:ext uri="{FF2B5EF4-FFF2-40B4-BE49-F238E27FC236}">
+                <a16:creationId xmlns:a16="http://schemas.microsoft.com/office/drawing/2014/main" id="{B3BE03B1-9C61-D8E5-0838-F06531FBDC73}"/>
+              </a:ext>
+            </a:extLst>
+          </p:cNvPr>
+          <p:cNvSpPr>
+            <a:spLocks noGrp="1"/>
+          </p:cNvSpPr>
+          <p:nvPr>
+            <p:ph type="subTitle" idx="1"/>
+          </p:nvPr>
+        </p:nvSpPr>
+        <p:spPr>
+          <a:xfrm>
+            <a:off x="1371600" y="1866122"/>
+            <a:ext cx="6400800" cy="3772678"/>
+          </a:xfrm>
+        </p:spPr>
+        <p:txBody>
+          <a:bodyPr>
+            <a:normAutofit/>
+          </a:bodyPr>
+          <a:lstStyle/>
+          <a:p>
+            <a:pPr marL="0" indent="0" algn="just" rtl="0" eaLnBrk="1" latinLnBrk="0" hangingPunct="1">
+              <a:lnSpc>
+                <a:spcPts val="1425"/>
+              </a:lnSpc>
+              <a:spcBef>
+                <a:spcPts val="384"/>
+              </a:spcBef>
+              <a:buNone/>
+            </a:pPr>
+            <a:r>
+              <a:rPr lang="es-ES" sz="1600" dirty="0">
+                <a:solidFill>
+                  <a:srgbClr val="000000"/>
+                </a:solidFill>
+                <a:effectLst/>
+                <a:latin typeface="Calibri" panose="020F0502020204030204" pitchFamily="34" charset="0"/>
+              </a:rPr>
+              <a:t>Este trabajo tiene como objetivo crear un modelo de clasificación supervisado que automatice la decisión sobre el tratamiento de órdenes relacionadas con desviaciones en el consumo de servicios de energía, agua y gas de EPM. Estas órdenes se emiten cuando los consumos superan los límites legales en un periodo determinado. Actualmente, analistas revisan estas órdenes manualmente, y el modelo busca replicar este proceso con datos históricos para reducir visitas innecesarias y optimizar costos operativos.</a:t>
+            </a:r>
+            <a:endParaRPr lang="es-CO" dirty="0"/>
+          </a:p>
+        </p:txBody>
+      </p:sp>
+      <p:pic>
+        <p:nvPicPr>
+          <p:cNvPr id="4" name="Picture 2" descr="Universidad de Medellín - Universidad de Medellín">
+            <a:extLst>
+              <a:ext uri="{FF2B5EF4-FFF2-40B4-BE49-F238E27FC236}">
+                <a16:creationId xmlns:a16="http://schemas.microsoft.com/office/drawing/2014/main" id="{0CB479C0-29A0-953D-15B7-8E6059195CAE}"/>
+              </a:ext>
+            </a:extLst>
+          </p:cNvPr>
+          <p:cNvPicPr>
+            <a:picLocks noChangeAspect="1" noChangeArrowheads="1"/>
+          </p:cNvPicPr>
+          <p:nvPr/>
+        </p:nvPicPr>
+        <p:blipFill>
+          <a:blip r:embed="rId2">
+            <a:extLst>
+              <a:ext uri="{28A0092B-C50C-407E-A947-70E740481C1C}">
+                <a14:useLocalDpi xmlns:a14="http://schemas.microsoft.com/office/drawing/2010/main" val="0"/>
+              </a:ext>
+            </a:extLst>
+          </a:blip>
+          <a:srcRect/>
+          <a:stretch>
+            <a:fillRect/>
+          </a:stretch>
+        </p:blipFill>
+        <p:spPr bwMode="auto">
+          <a:xfrm>
+            <a:off x="1" y="1"/>
+            <a:ext cx="2136710" cy="761098"/>
+          </a:xfrm>
+          <a:prstGeom prst="rect">
+            <a:avLst/>
+          </a:prstGeom>
+          <a:noFill/>
+          <a:extLst>
+            <a:ext uri="{909E8E84-426E-40DD-AFC4-6F175D3DCCD1}">
+              <a14:hiddenFill xmlns:a14="http://schemas.microsoft.com/office/drawing/2010/main">
+                <a:solidFill>
+                  <a:srgbClr val="FFFFFF"/>
+                </a:solidFill>
+              </a14:hiddenFill>
+            </a:ext>
+          </a:extLst>
+        </p:spPr>
+      </p:pic>
+      <p:pic>
+        <p:nvPicPr>
+          <p:cNvPr id="10" name="Imagen 9">
+            <a:extLst>
+              <a:ext uri="{FF2B5EF4-FFF2-40B4-BE49-F238E27FC236}">
+                <a16:creationId xmlns:a16="http://schemas.microsoft.com/office/drawing/2014/main" id="{CF8082C2-4B29-3E40-7B9C-EAE041A49A3A}"/>
+              </a:ext>
+            </a:extLst>
+          </p:cNvPr>
+          <p:cNvPicPr>
+            <a:picLocks noChangeAspect="1"/>
+          </p:cNvPicPr>
+          <p:nvPr/>
+        </p:nvPicPr>
+        <p:blipFill>
+          <a:blip r:embed="rId3"/>
+          <a:stretch>
+            <a:fillRect/>
+          </a:stretch>
+        </p:blipFill>
+        <p:spPr>
+          <a:xfrm>
+            <a:off x="2926214" y="4323635"/>
+            <a:ext cx="3109229" cy="2110923"/>
+          </a:xfrm>
+          <a:prstGeom prst="rect">
+            <a:avLst/>
+          </a:prstGeom>
+        </p:spPr>
+      </p:pic>
+    </p:spTree>
+    <p:extLst>
+      <p:ext uri="{BB962C8B-B14F-4D97-AF65-F5344CB8AC3E}">
+        <p14:creationId xmlns:p14="http://schemas.microsoft.com/office/powerpoint/2010/main" val="3516856053"/>
+      </p:ext>
+    </p:extLst>
+  </p:cSld>
+  <p:clrMapOvr>
+    <a:masterClrMapping/>
+  </p:clrMapOvr>
+</p:sld>
+</file>
+
+<file path=ppt/slides/slide3.xml><?xml version="1.0" encoding="utf-8"?>
+<p:sld xmlns:a="http://schemas.openxmlformats.org/drawingml/2006/main" xmlns:r="http://schemas.openxmlformats.org/officeDocument/2006/relationships" xmlns:p="http://schemas.openxmlformats.org/presentationml/2006/main">
+  <p:cSld>
+    <p:spTree>
+      <p:nvGrpSpPr>
         <p:cNvPr id="1" name="">
           <a:extLst>
             <a:ext uri="{FF2B5EF4-FFF2-40B4-BE49-F238E27FC236}">
@@ -20427,224 +20156,6 @@
 </p:sld>
 </file>
 
-<file path=ppt/slides/slide3.xml><?xml version="1.0" encoding="utf-8"?>
-<p:sld xmlns:a="http://schemas.openxmlformats.org/drawingml/2006/main" xmlns:r="http://schemas.openxmlformats.org/officeDocument/2006/relationships" xmlns:p="http://schemas.openxmlformats.org/presentationml/2006/main">
-  <p:cSld>
-    <p:spTree>
-      <p:nvGrpSpPr>
-        <p:cNvPr id="1" name=""/>
-        <p:cNvGrpSpPr/>
-        <p:nvPr/>
-      </p:nvGrpSpPr>
-      <p:grpSpPr>
-        <a:xfrm>
-          <a:off x="0" y="0"/>
-          <a:ext cx="0" cy="0"/>
-          <a:chOff x="0" y="0"/>
-          <a:chExt cx="0" cy="0"/>
-        </a:xfrm>
-      </p:grpSpPr>
-      <p:sp>
-        <p:nvSpPr>
-          <p:cNvPr id="2" name="Título 1">
-            <a:extLst>
-              <a:ext uri="{FF2B5EF4-FFF2-40B4-BE49-F238E27FC236}">
-                <a16:creationId xmlns:a16="http://schemas.microsoft.com/office/drawing/2014/main" id="{0A1DA919-2214-A080-682F-35C5CD13B58D}"/>
-              </a:ext>
-            </a:extLst>
-          </p:cNvPr>
-          <p:cNvSpPr>
-            <a:spLocks noGrp="1"/>
-          </p:cNvSpPr>
-          <p:nvPr>
-            <p:ph type="ctrTitle"/>
-          </p:nvPr>
-        </p:nvSpPr>
-        <p:spPr>
-          <a:xfrm>
-            <a:off x="685800" y="814810"/>
-            <a:ext cx="7772400" cy="752734"/>
-          </a:xfrm>
-        </p:spPr>
-        <p:txBody>
-          <a:bodyPr>
-            <a:normAutofit fontScale="90000"/>
-          </a:bodyPr>
-          <a:lstStyle/>
-          <a:p>
-            <a:r>
-              <a:rPr lang="es-CO" b="1" dirty="0">
-                <a:effectLst/>
-              </a:rPr>
-              <a:t>Contexto del Proyecto</a:t>
-            </a:r>
-            <a:endParaRPr lang="es-CO" dirty="0"/>
-          </a:p>
-        </p:txBody>
-      </p:sp>
-      <p:sp>
-        <p:nvSpPr>
-          <p:cNvPr id="3" name="Subtítulo 2">
-            <a:extLst>
-              <a:ext uri="{FF2B5EF4-FFF2-40B4-BE49-F238E27FC236}">
-                <a16:creationId xmlns:a16="http://schemas.microsoft.com/office/drawing/2014/main" id="{B3BE03B1-9C61-D8E5-0838-F06531FBDC73}"/>
-              </a:ext>
-            </a:extLst>
-          </p:cNvPr>
-          <p:cNvSpPr>
-            <a:spLocks noGrp="1"/>
-          </p:cNvSpPr>
-          <p:nvPr>
-            <p:ph type="subTitle" idx="1"/>
-          </p:nvPr>
-        </p:nvSpPr>
-        <p:spPr>
-          <a:xfrm>
-            <a:off x="1371600" y="1866122"/>
-            <a:ext cx="6400800" cy="3772678"/>
-          </a:xfrm>
-        </p:spPr>
-        <p:txBody>
-          <a:bodyPr>
-            <a:normAutofit/>
-          </a:bodyPr>
-          <a:lstStyle/>
-          <a:p>
-            <a:pPr algn="just">
-              <a:lnSpc>
-                <a:spcPts val="1425"/>
-              </a:lnSpc>
-              <a:buNone/>
-            </a:pPr>
-            <a:r>
-              <a:rPr lang="es-ES" sz="1600" dirty="0">
-                <a:solidFill>
-                  <a:schemeClr val="tx1"/>
-                </a:solidFill>
-                <a:effectLst/>
-              </a:rPr>
-              <a:t>El presente trabajo tiene como objetivo construir un modelo supervisado de clasificación que permita automatizar la decisión sobre el tratamiento de órdenes de desviaciones significativas en consumos de los servicios de energía, acueducto, alcantarillado y gas que presta Empresas Públicas de Medellín (EPM) a sus clientes, generadas cuando se detectan consumos que se salen de unos rangos establecidos por ley en un periodo determinado.</a:t>
-            </a:r>
-          </a:p>
-          <a:p>
-            <a:pPr algn="just">
-              <a:lnSpc>
-                <a:spcPts val="1425"/>
-              </a:lnSpc>
-            </a:pPr>
-            <a:br>
-              <a:rPr lang="es-ES" sz="1600" dirty="0">
-                <a:solidFill>
-                  <a:schemeClr val="tx1"/>
-                </a:solidFill>
-                <a:effectLst/>
-              </a:rPr>
-            </a:br>
-            <a:r>
-              <a:rPr lang="es-ES" sz="1600" dirty="0">
-                <a:solidFill>
-                  <a:schemeClr val="tx1"/>
-                </a:solidFill>
-                <a:effectLst/>
-              </a:rPr>
-              <a:t>Actualmente, estas órdenes son revisadas manualmente por un equipo de analistas que determina si deben legalizar o enviarse una revisión a terreno para tener mas argumentos. El desarrollo de este modelo busca replicar ese proceso humano a partir de datos históricos, con el fin de reducir visitas innecesarias y optimizar los costos operativos asociados.</a:t>
-            </a:r>
-          </a:p>
-          <a:p>
-            <a:endParaRPr lang="es-CO" dirty="0"/>
-          </a:p>
-        </p:txBody>
-      </p:sp>
-      <p:pic>
-        <p:nvPicPr>
-          <p:cNvPr id="4" name="Picture 2" descr="Universidad de Medellín - Universidad de Medellín">
-            <a:extLst>
-              <a:ext uri="{FF2B5EF4-FFF2-40B4-BE49-F238E27FC236}">
-                <a16:creationId xmlns:a16="http://schemas.microsoft.com/office/drawing/2014/main" id="{0CB479C0-29A0-953D-15B7-8E6059195CAE}"/>
-              </a:ext>
-            </a:extLst>
-          </p:cNvPr>
-          <p:cNvPicPr>
-            <a:picLocks noChangeAspect="1" noChangeArrowheads="1"/>
-          </p:cNvPicPr>
-          <p:nvPr/>
-        </p:nvPicPr>
-        <p:blipFill>
-          <a:blip r:embed="rId2">
-            <a:extLst>
-              <a:ext uri="{28A0092B-C50C-407E-A947-70E740481C1C}">
-                <a14:useLocalDpi xmlns:a14="http://schemas.microsoft.com/office/drawing/2010/main" val="0"/>
-              </a:ext>
-            </a:extLst>
-          </a:blip>
-          <a:srcRect/>
-          <a:stretch>
-            <a:fillRect/>
-          </a:stretch>
-        </p:blipFill>
-        <p:spPr bwMode="auto">
-          <a:xfrm>
-            <a:off x="1" y="1"/>
-            <a:ext cx="2136710" cy="761098"/>
-          </a:xfrm>
-          <a:prstGeom prst="rect">
-            <a:avLst/>
-          </a:prstGeom>
-          <a:noFill/>
-          <a:extLst>
-            <a:ext uri="{909E8E84-426E-40DD-AFC4-6F175D3DCCD1}">
-              <a14:hiddenFill xmlns:a14="http://schemas.microsoft.com/office/drawing/2010/main">
-                <a:solidFill>
-                  <a:srgbClr val="FFFFFF"/>
-                </a:solidFill>
-              </a14:hiddenFill>
-            </a:ext>
-          </a:extLst>
-        </p:spPr>
-      </p:pic>
-      <p:pic>
-        <p:nvPicPr>
-          <p:cNvPr id="10" name="Imagen 9">
-            <a:extLst>
-              <a:ext uri="{FF2B5EF4-FFF2-40B4-BE49-F238E27FC236}">
-                <a16:creationId xmlns:a16="http://schemas.microsoft.com/office/drawing/2014/main" id="{CF8082C2-4B29-3E40-7B9C-EAE041A49A3A}"/>
-              </a:ext>
-            </a:extLst>
-          </p:cNvPr>
-          <p:cNvPicPr>
-            <a:picLocks noChangeAspect="1"/>
-          </p:cNvPicPr>
-          <p:nvPr/>
-        </p:nvPicPr>
-        <p:blipFill>
-          <a:blip r:embed="rId3"/>
-          <a:stretch>
-            <a:fillRect/>
-          </a:stretch>
-        </p:blipFill>
-        <p:spPr>
-          <a:xfrm>
-            <a:off x="2926214" y="4323635"/>
-            <a:ext cx="3109229" cy="2110923"/>
-          </a:xfrm>
-          <a:prstGeom prst="rect">
-            <a:avLst/>
-          </a:prstGeom>
-        </p:spPr>
-      </p:pic>
-    </p:spTree>
-    <p:extLst>
-      <p:ext uri="{BB962C8B-B14F-4D97-AF65-F5344CB8AC3E}">
-        <p14:creationId xmlns:p14="http://schemas.microsoft.com/office/powerpoint/2010/main" val="3516856053"/>
-      </p:ext>
-    </p:extLst>
-  </p:cSld>
-  <p:clrMapOvr>
-    <a:masterClrMapping/>
-  </p:clrMapOvr>
-</p:sld>
-</file>
-
 <file path=ppt/slides/slide4.xml><?xml version="1.0" encoding="utf-8"?>
 <p:sld xmlns:a="http://schemas.openxmlformats.org/drawingml/2006/main" xmlns:r="http://schemas.openxmlformats.org/officeDocument/2006/relationships" xmlns:p="http://schemas.openxmlformats.org/presentationml/2006/main">
   <p:cSld>
@@ -20734,148 +20245,169 @@
           </a:bodyPr>
           <a:lstStyle/>
           <a:p>
-            <a:pPr algn="l">
+            <a:pPr marL="0" indent="0" algn="l" rtl="0" eaLnBrk="1" latinLnBrk="0" hangingPunct="1">
               <a:lnSpc>
                 <a:spcPts val="1425"/>
               </a:lnSpc>
+              <a:spcBef>
+                <a:spcPts val="384"/>
+              </a:spcBef>
               <a:buNone/>
             </a:pPr>
             <a:r>
-              <a:rPr lang="es-ES" sz="1600" b="0" dirty="0">
+              <a:rPr lang="es-ES" sz="1600" dirty="0">
                 <a:solidFill>
-                  <a:schemeClr val="tx1"/>
+                  <a:srgbClr val="000000"/>
                 </a:solidFill>
                 <a:effectLst/>
+                <a:latin typeface="Calibri" panose="020F0502020204030204" pitchFamily="34" charset="0"/>
               </a:rPr>
-              <a:t>Para lograr este objetivo, se ejecuta el siguiente flujo de trabajo:</a:t>
-            </a:r>
-          </a:p>
-          <a:p>
-            <a:pPr algn="l">
+              <a:t>Para alcanzar este objetivo, se sigue este flujo de trabajo:</a:t>
+            </a:r>
+          </a:p>
+          <a:p>
+            <a:pPr marL="0" indent="0" algn="l" rtl="0" eaLnBrk="1" latinLnBrk="0" hangingPunct="1">
               <a:lnSpc>
                 <a:spcPts val="1425"/>
               </a:lnSpc>
+              <a:spcBef>
+                <a:spcPts val="384"/>
+              </a:spcBef>
               <a:buNone/>
             </a:pPr>
             <a:br>
-              <a:rPr lang="es-ES" sz="1600" b="0" dirty="0">
+              <a:rPr lang="es-ES" sz="1600" dirty="0">
                 <a:solidFill>
-                  <a:schemeClr val="tx1"/>
+                  <a:srgbClr val="000000"/>
                 </a:solidFill>
                 <a:effectLst/>
+                <a:latin typeface="Calibri" panose="020F0502020204030204" pitchFamily="34" charset="0"/>
               </a:rPr>
             </a:br>
             <a:r>
               <a:rPr lang="es-ES" sz="1600" dirty="0">
                 <a:solidFill>
-                  <a:schemeClr val="tx1"/>
+                  <a:srgbClr val="000000"/>
                 </a:solidFill>
                 <a:effectLst/>
+                <a:latin typeface="Calibri" panose="020F0502020204030204" pitchFamily="34" charset="0"/>
               </a:rPr>
               <a:t>1. Análisis Exploratorio de Datos (EDA)</a:t>
             </a:r>
           </a:p>
           <a:p>
-            <a:pPr algn="l">
+            <a:pPr marL="0" indent="0" algn="l" rtl="0" eaLnBrk="1" latinLnBrk="0" hangingPunct="1">
               <a:lnSpc>
                 <a:spcPts val="1425"/>
               </a:lnSpc>
-              <a:buNone/>
+              <a:spcBef>
+                <a:spcPts val="384"/>
+              </a:spcBef>
+              <a:buFont typeface="+mj-lt"/>
+              <a:buAutoNum type="arabicPeriod" startAt="2"/>
             </a:pPr>
             <a:r>
               <a:rPr lang="es-ES" sz="1600" dirty="0">
                 <a:solidFill>
-                  <a:schemeClr val="tx1"/>
+                  <a:srgbClr val="000000"/>
                 </a:solidFill>
                 <a:effectLst/>
+                <a:latin typeface="Calibri" panose="020F0502020204030204" pitchFamily="34" charset="0"/>
               </a:rPr>
-              <a:t>2. Depuración y preparación de los datos</a:t>
-            </a:r>
-          </a:p>
-          <a:p>
-            <a:pPr algn="l">
+              <a:t>Limpieza y preparación de datos</a:t>
+            </a:r>
+          </a:p>
+          <a:p>
+            <a:pPr marL="0" indent="0" algn="l" rtl="0" eaLnBrk="1" latinLnBrk="0" hangingPunct="1">
               <a:lnSpc>
                 <a:spcPts val="1425"/>
               </a:lnSpc>
-              <a:buNone/>
+              <a:spcBef>
+                <a:spcPts val="384"/>
+              </a:spcBef>
+              <a:buFont typeface="+mj-lt"/>
+              <a:buAutoNum type="arabicPeriod" startAt="2"/>
             </a:pPr>
             <a:r>
               <a:rPr lang="es-ES" sz="1600" dirty="0">
                 <a:solidFill>
-                  <a:schemeClr val="tx1"/>
+                  <a:srgbClr val="000000"/>
                 </a:solidFill>
                 <a:effectLst/>
+                <a:latin typeface="Calibri" panose="020F0502020204030204" pitchFamily="34" charset="0"/>
               </a:rPr>
-              <a:t>3. Entrenamiento y comparación de modelos de clasificación:</a:t>
-            </a:r>
-          </a:p>
-          <a:p>
-            <a:pPr algn="l">
+              <a:t>Entrenamiento y comparación de modelos de clasificación:</a:t>
+            </a:r>
+          </a:p>
+          <a:p>
+            <a:pPr lvl="1" algn="l">
               <a:lnSpc>
                 <a:spcPts val="1425"/>
               </a:lnSpc>
-              <a:buNone/>
+              <a:spcBef>
+                <a:spcPts val="384"/>
+              </a:spcBef>
             </a:pPr>
             <a:r>
-              <a:rPr lang="es-ES" sz="1600" dirty="0">
+              <a:rPr lang="es-ES" sz="1200" dirty="0">
                 <a:solidFill>
-                  <a:schemeClr val="tx1"/>
+                  <a:srgbClr val="000000"/>
                 </a:solidFill>
                 <a:effectLst/>
+                <a:latin typeface="Calibri" panose="020F0502020204030204" pitchFamily="34" charset="0"/>
               </a:rPr>
-              <a:t>   - </a:t>
-            </a:r>
-            <a:r>
-              <a:rPr lang="es-ES" sz="1600" dirty="0" err="1">
+              <a:t>- </a:t>
+            </a:r>
+            <a:r>
+              <a:rPr lang="es-ES" sz="1200" dirty="0" err="1">
                 <a:solidFill>
-                  <a:schemeClr val="tx1"/>
+                  <a:srgbClr val="000000"/>
                 </a:solidFill>
                 <a:effectLst/>
+                <a:latin typeface="Calibri" panose="020F0502020204030204" pitchFamily="34" charset="0"/>
               </a:rPr>
               <a:t>Random</a:t>
             </a:r>
             <a:r>
-              <a:rPr lang="es-ES" sz="1600" dirty="0">
+              <a:rPr lang="es-ES" sz="1200" dirty="0">
                 <a:solidFill>
-                  <a:schemeClr val="tx1"/>
+                  <a:srgbClr val="000000"/>
                 </a:solidFill>
                 <a:effectLst/>
+                <a:latin typeface="Calibri" panose="020F0502020204030204" pitchFamily="34" charset="0"/>
               </a:rPr>
               <a:t> Forest</a:t>
             </a:r>
           </a:p>
           <a:p>
-            <a:pPr algn="l">
+            <a:pPr lvl="1" algn="l">
               <a:lnSpc>
                 <a:spcPts val="1425"/>
               </a:lnSpc>
+              <a:spcBef>
+                <a:spcPts val="384"/>
+              </a:spcBef>
             </a:pPr>
             <a:r>
-              <a:rPr lang="es-ES" sz="1600" dirty="0">
+              <a:rPr lang="es-ES" sz="1200" dirty="0">
                 <a:solidFill>
-                  <a:schemeClr val="tx1"/>
+                  <a:srgbClr val="000000"/>
                 </a:solidFill>
                 <a:effectLst/>
+                <a:latin typeface="Calibri" panose="020F0502020204030204" pitchFamily="34" charset="0"/>
               </a:rPr>
-              <a:t>   - </a:t>
-            </a:r>
-            <a:r>
-              <a:rPr lang="es-ES" sz="1600" dirty="0" err="1">
+              <a:t>- </a:t>
+            </a:r>
+            <a:r>
+              <a:rPr lang="es-ES" sz="1200" dirty="0" err="1">
                 <a:solidFill>
-                  <a:schemeClr val="tx1"/>
+                  <a:srgbClr val="000000"/>
                 </a:solidFill>
                 <a:effectLst/>
+                <a:latin typeface="Calibri" panose="020F0502020204030204" pitchFamily="34" charset="0"/>
               </a:rPr>
               <a:t>XGBoost</a:t>
             </a:r>
-            <a:endParaRPr lang="es-ES" sz="1600" dirty="0">
-              <a:solidFill>
-                <a:schemeClr val="tx1"/>
-              </a:solidFill>
-              <a:effectLst/>
-            </a:endParaRPr>
-          </a:p>
-          <a:p>
             <a:endParaRPr lang="es-CO" dirty="0"/>
           </a:p>
         </p:txBody>
@@ -21005,7 +20537,7 @@
         <p:spPr>
           <a:xfrm>
             <a:off x="452536" y="4444611"/>
-            <a:ext cx="6400800" cy="1744824"/>
+            <a:ext cx="6400800" cy="463289"/>
           </a:xfrm>
           <a:prstGeom prst="rect">
             <a:avLst/>
@@ -21171,52 +20703,43 @@
             </a:lvl9pPr>
           </a:lstStyle>
           <a:p>
-            <a:pPr algn="just">
+            <a:pPr marL="0" indent="0" algn="just" rtl="0" eaLnBrk="1" latinLnBrk="0" hangingPunct="1">
               <a:lnSpc>
                 <a:spcPts val="1425"/>
               </a:lnSpc>
+              <a:spcBef>
+                <a:spcPts val="384"/>
+              </a:spcBef>
               <a:buNone/>
             </a:pPr>
             <a:r>
-              <a:rPr lang="es-ES" sz="1600" b="0" dirty="0">
+              <a:rPr lang="es-ES" sz="1600" dirty="0">
                 <a:solidFill>
-                  <a:schemeClr val="tx1"/>
+                  <a:srgbClr val="000000"/>
                 </a:solidFill>
                 <a:effectLst/>
+                <a:latin typeface="Calibri" panose="020F0502020204030204" pitchFamily="34" charset="0"/>
               </a:rPr>
-              <a:t>Se evaluará el desempeño de cada modelo utilizando la métrica F1 Score, ideal para escenarios con datos desbalanceados, ya que equilibra la precisión.</a:t>
-            </a:r>
-          </a:p>
-          <a:p>
-            <a:pPr algn="just">
+              <a:t>El rendimiento de cada modelo se medirá con la métrica F1 Score, que es adecuada para datos desbalanceados al equilibrar la precisión.</a:t>
+            </a:r>
+          </a:p>
+          <a:p>
+            <a:pPr marL="0" indent="0" algn="just" rtl="0" eaLnBrk="1" latinLnBrk="0" hangingPunct="1">
               <a:lnSpc>
                 <a:spcPts val="1425"/>
               </a:lnSpc>
+              <a:spcBef>
+                <a:spcPts val="384"/>
+              </a:spcBef>
+              <a:buNone/>
             </a:pPr>
             <a:endParaRPr lang="es-ES" sz="1600" dirty="0">
               <a:solidFill>
-                <a:schemeClr val="tx1"/>
+                <a:srgbClr val="000000"/>
               </a:solidFill>
+              <a:effectLst/>
+              <a:latin typeface="Calibri" panose="020F0502020204030204" pitchFamily="34" charset="0"/>
             </a:endParaRPr>
-          </a:p>
-          <a:p>
-            <a:pPr algn="just">
-              <a:lnSpc>
-                <a:spcPts val="1425"/>
-              </a:lnSpc>
-            </a:pPr>
-            <a:r>
-              <a:rPr lang="es-ES" sz="1600" b="0" dirty="0">
-                <a:solidFill>
-                  <a:schemeClr val="tx1"/>
-                </a:solidFill>
-                <a:effectLst/>
-              </a:rPr>
-              <a:t>La división de los datos será del 70% para entrenamiento y 15% para test y 15% para validación.</a:t>
-            </a:r>
-          </a:p>
-          <a:p>
-            <a:endParaRPr lang="es-CO" dirty="0"/>
           </a:p>
         </p:txBody>
       </p:sp>
@@ -21285,1305 +20808,6 @@
           <p:cNvPr id="2" name="Título 1">
             <a:extLst>
               <a:ext uri="{FF2B5EF4-FFF2-40B4-BE49-F238E27FC236}">
-                <a16:creationId xmlns:a16="http://schemas.microsoft.com/office/drawing/2014/main" id="{3B8C031D-7BD3-0A09-C3A7-6A593257CE48}"/>
-              </a:ext>
-            </a:extLst>
-          </p:cNvPr>
-          <p:cNvSpPr>
-            <a:spLocks noGrp="1"/>
-          </p:cNvSpPr>
-          <p:nvPr>
-            <p:ph type="ctrTitle"/>
-          </p:nvPr>
-        </p:nvSpPr>
-        <p:spPr>
-          <a:xfrm>
-            <a:off x="685800" y="233265"/>
-            <a:ext cx="7772400" cy="1221144"/>
-          </a:xfrm>
-        </p:spPr>
-        <p:txBody>
-          <a:bodyPr>
-            <a:normAutofit/>
-          </a:bodyPr>
-          <a:lstStyle/>
-          <a:p>
-            <a:r>
-              <a:rPr lang="es-CO" sz="2800" b="1" dirty="0">
-                <a:effectLst/>
-              </a:rPr>
-              <a:t>Descripción de los Datos</a:t>
-            </a:r>
-            <a:r>
-              <a:rPr lang="es-CO" sz="2800" b="1" dirty="0"/>
-              <a:t>.</a:t>
-            </a:r>
-          </a:p>
-        </p:txBody>
-      </p:sp>
-      <p:sp>
-        <p:nvSpPr>
-          <p:cNvPr id="3" name="Subtítulo 2">
-            <a:extLst>
-              <a:ext uri="{FF2B5EF4-FFF2-40B4-BE49-F238E27FC236}">
-                <a16:creationId xmlns:a16="http://schemas.microsoft.com/office/drawing/2014/main" id="{D20497CF-6FD1-B42E-070E-9F338761FDF2}"/>
-              </a:ext>
-            </a:extLst>
-          </p:cNvPr>
-          <p:cNvSpPr>
-            <a:spLocks noGrp="1"/>
-          </p:cNvSpPr>
-          <p:nvPr>
-            <p:ph type="subTitle" idx="1"/>
-          </p:nvPr>
-        </p:nvSpPr>
-        <p:spPr>
-          <a:xfrm>
-            <a:off x="345233" y="1287624"/>
-            <a:ext cx="8406881" cy="2304662"/>
-          </a:xfrm>
-        </p:spPr>
-        <p:txBody>
-          <a:bodyPr>
-            <a:normAutofit fontScale="70000" lnSpcReduction="20000"/>
-          </a:bodyPr>
-          <a:lstStyle/>
-          <a:p>
-            <a:pPr algn="just">
-              <a:lnSpc>
-                <a:spcPts val="1425"/>
-              </a:lnSpc>
-              <a:buNone/>
-            </a:pPr>
-            <a:r>
-              <a:rPr lang="es-ES" sz="2300" b="0" dirty="0">
-                <a:solidFill>
-                  <a:schemeClr val="tx1"/>
-                </a:solidFill>
-                <a:effectLst/>
-              </a:rPr>
-              <a:t>Para el entrenamiento del modelo supervisado de clasificación se cuenta con un conjunto de datos históricos que contiene información sobre órdenes de desviación significativa generadas por incrementos en el consumo de servicios públicos. Estas órdenes fueron previamente revisadas por analistas, quienes tomaron decisiones basadas en las condiciones observadas.</a:t>
-            </a:r>
-          </a:p>
-          <a:p>
-            <a:pPr algn="l">
-              <a:lnSpc>
-                <a:spcPts val="1425"/>
-              </a:lnSpc>
-              <a:buNone/>
-            </a:pPr>
-            <a:endParaRPr lang="es-ES" sz="2300" dirty="0">
-              <a:solidFill>
-                <a:schemeClr val="tx1"/>
-              </a:solidFill>
-            </a:endParaRPr>
-          </a:p>
-          <a:p>
-            <a:pPr algn="l">
-              <a:lnSpc>
-                <a:spcPts val="1425"/>
-              </a:lnSpc>
-              <a:buNone/>
-            </a:pPr>
-            <a:r>
-              <a:rPr lang="es-ES" sz="2300" b="1" dirty="0">
-                <a:solidFill>
-                  <a:schemeClr val="tx1"/>
-                </a:solidFill>
-                <a:effectLst/>
-              </a:rPr>
-              <a:t>Variable Objetivo: RESPUESTA</a:t>
-            </a:r>
-            <a:endParaRPr lang="es-ES" sz="2300" b="0" dirty="0">
-              <a:solidFill>
-                <a:schemeClr val="tx1"/>
-              </a:solidFill>
-              <a:effectLst/>
-            </a:endParaRPr>
-          </a:p>
-          <a:p>
-            <a:pPr algn="l">
-              <a:lnSpc>
-                <a:spcPts val="1425"/>
-              </a:lnSpc>
-              <a:buNone/>
-            </a:pPr>
-            <a:br>
-              <a:rPr lang="es-ES" sz="2300" b="0" dirty="0">
-                <a:solidFill>
-                  <a:schemeClr val="tx1"/>
-                </a:solidFill>
-                <a:effectLst/>
-              </a:rPr>
-            </a:br>
-            <a:r>
-              <a:rPr lang="es-ES" sz="2300" b="0" dirty="0">
-                <a:solidFill>
-                  <a:schemeClr val="tx1"/>
-                </a:solidFill>
-                <a:effectLst/>
-              </a:rPr>
-              <a:t>La variable RESPUESTA representa la decisión final tomada por el analista, y se comporta de la siguiente manera:</a:t>
-            </a:r>
-          </a:p>
-          <a:p>
-            <a:pPr algn="l">
-              <a:lnSpc>
-                <a:spcPts val="1425"/>
-              </a:lnSpc>
-              <a:buNone/>
-            </a:pPr>
-            <a:br>
-              <a:rPr lang="es-ES" sz="1200" b="0" dirty="0">
-                <a:solidFill>
-                  <a:schemeClr val="tx1"/>
-                </a:solidFill>
-                <a:effectLst/>
-              </a:rPr>
-            </a:br>
-            <a:endParaRPr lang="es-ES" sz="1200" b="0" dirty="0">
-              <a:solidFill>
-                <a:schemeClr val="tx1"/>
-              </a:solidFill>
-              <a:effectLst/>
-            </a:endParaRPr>
-          </a:p>
-          <a:p>
-            <a:pPr algn="l">
-              <a:lnSpc>
-                <a:spcPts val="1425"/>
-              </a:lnSpc>
-              <a:buNone/>
-            </a:pPr>
-            <a:endParaRPr lang="es-CO" dirty="0"/>
-          </a:p>
-          <a:p>
-            <a:pPr algn="l">
-              <a:lnSpc>
-                <a:spcPts val="1425"/>
-              </a:lnSpc>
-              <a:buNone/>
-            </a:pPr>
-            <a:endParaRPr lang="es-CO" dirty="0"/>
-          </a:p>
-          <a:p>
-            <a:pPr algn="l">
-              <a:lnSpc>
-                <a:spcPts val="1425"/>
-              </a:lnSpc>
-              <a:buNone/>
-            </a:pPr>
-            <a:endParaRPr lang="es-CO" dirty="0"/>
-          </a:p>
-          <a:p>
-            <a:pPr algn="l">
-              <a:lnSpc>
-                <a:spcPts val="1425"/>
-              </a:lnSpc>
-              <a:buNone/>
-            </a:pPr>
-            <a:endParaRPr lang="es-CO" dirty="0"/>
-          </a:p>
-          <a:p>
-            <a:pPr algn="l">
-              <a:lnSpc>
-                <a:spcPts val="1425"/>
-              </a:lnSpc>
-              <a:buNone/>
-            </a:pPr>
-            <a:endParaRPr lang="es-CO" dirty="0"/>
-          </a:p>
-          <a:p>
-            <a:pPr algn="l">
-              <a:lnSpc>
-                <a:spcPts val="1425"/>
-              </a:lnSpc>
-              <a:buNone/>
-            </a:pPr>
-            <a:endParaRPr lang="es-CO" dirty="0"/>
-          </a:p>
-          <a:p>
-            <a:pPr algn="l">
-              <a:lnSpc>
-                <a:spcPts val="1425"/>
-              </a:lnSpc>
-              <a:buNone/>
-            </a:pPr>
-            <a:endParaRPr lang="es-CO" dirty="0"/>
-          </a:p>
-          <a:p>
-            <a:pPr algn="l">
-              <a:lnSpc>
-                <a:spcPts val="1425"/>
-              </a:lnSpc>
-              <a:buNone/>
-            </a:pPr>
-            <a:endParaRPr lang="es-CO" dirty="0"/>
-          </a:p>
-          <a:p>
-            <a:pPr algn="l">
-              <a:lnSpc>
-                <a:spcPts val="1425"/>
-              </a:lnSpc>
-              <a:buNone/>
-            </a:pPr>
-            <a:endParaRPr lang="es-CO" dirty="0"/>
-          </a:p>
-          <a:p>
-            <a:pPr algn="l">
-              <a:lnSpc>
-                <a:spcPts val="1425"/>
-              </a:lnSpc>
-              <a:buNone/>
-            </a:pPr>
-            <a:endParaRPr lang="es-CO" dirty="0"/>
-          </a:p>
-        </p:txBody>
-      </p:sp>
-      <p:pic>
-        <p:nvPicPr>
-          <p:cNvPr id="4" name="Picture 2" descr="Universidad de Medellín - Universidad de Medellín">
-            <a:extLst>
-              <a:ext uri="{FF2B5EF4-FFF2-40B4-BE49-F238E27FC236}">
-                <a16:creationId xmlns:a16="http://schemas.microsoft.com/office/drawing/2014/main" id="{10C653DA-DCC1-6BDE-1D76-DCF7A9135290}"/>
-              </a:ext>
-            </a:extLst>
-          </p:cNvPr>
-          <p:cNvPicPr>
-            <a:picLocks noChangeAspect="1" noChangeArrowheads="1"/>
-          </p:cNvPicPr>
-          <p:nvPr/>
-        </p:nvPicPr>
-        <p:blipFill>
-          <a:blip r:embed="rId2">
-            <a:extLst>
-              <a:ext uri="{28A0092B-C50C-407E-A947-70E740481C1C}">
-                <a14:useLocalDpi xmlns:a14="http://schemas.microsoft.com/office/drawing/2010/main" val="0"/>
-              </a:ext>
-            </a:extLst>
-          </a:blip>
-          <a:srcRect/>
-          <a:stretch>
-            <a:fillRect/>
-          </a:stretch>
-        </p:blipFill>
-        <p:spPr bwMode="auto">
-          <a:xfrm>
-            <a:off x="1" y="1"/>
-            <a:ext cx="2136710" cy="761098"/>
-          </a:xfrm>
-          <a:prstGeom prst="rect">
-            <a:avLst/>
-          </a:prstGeom>
-          <a:noFill/>
-          <a:extLst>
-            <a:ext uri="{909E8E84-426E-40DD-AFC4-6F175D3DCCD1}">
-              <a14:hiddenFill xmlns:a14="http://schemas.microsoft.com/office/drawing/2010/main">
-                <a:solidFill>
-                  <a:srgbClr val="FFFFFF"/>
-                </a:solidFill>
-              </a14:hiddenFill>
-            </a:ext>
-          </a:extLst>
-        </p:spPr>
-      </p:pic>
-      <p:graphicFrame>
-        <p:nvGraphicFramePr>
-          <p:cNvPr id="5" name="Tabla 4">
-            <a:extLst>
-              <a:ext uri="{FF2B5EF4-FFF2-40B4-BE49-F238E27FC236}">
-                <a16:creationId xmlns:a16="http://schemas.microsoft.com/office/drawing/2014/main" id="{1067C26E-9845-28C2-D4DC-579DE4CB0F48}"/>
-              </a:ext>
-            </a:extLst>
-          </p:cNvPr>
-          <p:cNvGraphicFramePr>
-            <a:graphicFrameLocks noGrp="1"/>
-          </p:cNvGraphicFramePr>
-          <p:nvPr>
-            <p:extLst>
-              <p:ext uri="{D42A27DB-BD31-4B8C-83A1-F6EECF244321}">
-                <p14:modId xmlns:p14="http://schemas.microsoft.com/office/powerpoint/2010/main" val="535745892"/>
-              </p:ext>
-            </p:extLst>
-          </p:nvPr>
-        </p:nvGraphicFramePr>
-        <p:xfrm>
-          <a:off x="391886" y="3149082"/>
-          <a:ext cx="7249882" cy="1554480"/>
-        </p:xfrm>
-        <a:graphic>
-          <a:graphicData uri="http://schemas.openxmlformats.org/drawingml/2006/table">
-            <a:tbl>
-              <a:tblPr firstRow="1" bandRow="1">
-                <a:tableStyleId>{5C22544A-7EE6-4342-B048-85BDC9FD1C3A}</a:tableStyleId>
-              </a:tblPr>
-              <a:tblGrid>
-                <a:gridCol w="998374">
-                  <a:extLst>
-                    <a:ext uri="{9D8B030D-6E8A-4147-A177-3AD203B41FA5}">
-                      <a16:colId xmlns:a16="http://schemas.microsoft.com/office/drawing/2014/main" val="3884276388"/>
-                    </a:ext>
-                  </a:extLst>
-                </a:gridCol>
-                <a:gridCol w="2425959">
-                  <a:extLst>
-                    <a:ext uri="{9D8B030D-6E8A-4147-A177-3AD203B41FA5}">
-                      <a16:colId xmlns:a16="http://schemas.microsoft.com/office/drawing/2014/main" val="3359673869"/>
-                    </a:ext>
-                  </a:extLst>
-                </a:gridCol>
-                <a:gridCol w="2276669">
-                  <a:extLst>
-                    <a:ext uri="{9D8B030D-6E8A-4147-A177-3AD203B41FA5}">
-                      <a16:colId xmlns:a16="http://schemas.microsoft.com/office/drawing/2014/main" val="4013225091"/>
-                    </a:ext>
-                  </a:extLst>
-                </a:gridCol>
-                <a:gridCol w="1548880">
-                  <a:extLst>
-                    <a:ext uri="{9D8B030D-6E8A-4147-A177-3AD203B41FA5}">
-                      <a16:colId xmlns:a16="http://schemas.microsoft.com/office/drawing/2014/main" val="837407753"/>
-                    </a:ext>
-                  </a:extLst>
-                </a:gridCol>
-              </a:tblGrid>
-              <a:tr h="228600">
-                <a:tc>
-                  <a:txBody>
-                    <a:bodyPr/>
-                    <a:lstStyle/>
-                    <a:p>
-                      <a:pPr algn="ctr"/>
-                      <a:r>
-                        <a:rPr lang="es-CO" sz="1600" dirty="0"/>
-                        <a:t>Caso</a:t>
-                      </a:r>
-                    </a:p>
-                  </a:txBody>
-                  <a:tcPr/>
-                </a:tc>
-                <a:tc>
-                  <a:txBody>
-                    <a:bodyPr/>
-                    <a:lstStyle/>
-                    <a:p>
-                      <a:pPr algn="ctr"/>
-                      <a:r>
-                        <a:rPr lang="es-MX" sz="1600" dirty="0"/>
-                        <a:t>¿Modificar consumo?</a:t>
-                      </a:r>
-                      <a:endParaRPr lang="es-CO" sz="1600" dirty="0"/>
-                    </a:p>
-                  </a:txBody>
-                  <a:tcPr/>
-                </a:tc>
-                <a:tc>
-                  <a:txBody>
-                    <a:bodyPr/>
-                    <a:lstStyle/>
-                    <a:p>
-                      <a:pPr algn="ctr"/>
-                      <a:r>
-                        <a:rPr lang="es-MX" sz="1600" dirty="0"/>
-                        <a:t>¿Enviar a terreno?</a:t>
-                      </a:r>
-                      <a:endParaRPr lang="es-CO" sz="1600" dirty="0"/>
-                    </a:p>
-                  </a:txBody>
-                  <a:tcPr/>
-                </a:tc>
-                <a:tc>
-                  <a:txBody>
-                    <a:bodyPr/>
-                    <a:lstStyle/>
-                    <a:p>
-                      <a:pPr algn="ctr"/>
-                      <a:r>
-                        <a:rPr lang="es-MX" sz="1600" dirty="0"/>
-                        <a:t>Respuesta</a:t>
-                      </a:r>
-                      <a:endParaRPr lang="es-CO" sz="1600" dirty="0"/>
-                    </a:p>
-                  </a:txBody>
-                  <a:tcPr/>
-                </a:tc>
-                <a:extLst>
-                  <a:ext uri="{0D108BD9-81ED-4DB2-BD59-A6C34878D82A}">
-                    <a16:rowId xmlns:a16="http://schemas.microsoft.com/office/drawing/2014/main" val="2252421095"/>
-                  </a:ext>
-                </a:extLst>
-              </a:tr>
-              <a:tr h="152752">
-                <a:tc>
-                  <a:txBody>
-                    <a:bodyPr/>
-                    <a:lstStyle/>
-                    <a:p>
-                      <a:pPr algn="ctr"/>
-                      <a:r>
-                        <a:rPr lang="es-CO" sz="1400" dirty="0"/>
-                        <a:t>1</a:t>
-                      </a:r>
-                    </a:p>
-                  </a:txBody>
-                  <a:tcPr/>
-                </a:tc>
-                <a:tc>
-                  <a:txBody>
-                    <a:bodyPr/>
-                    <a:lstStyle/>
-                    <a:p>
-                      <a:pPr algn="ctr"/>
-                      <a:r>
-                        <a:rPr lang="es-MX" sz="1400" dirty="0"/>
-                        <a:t>Sí</a:t>
-                      </a:r>
-                      <a:endParaRPr lang="es-CO" sz="1400" dirty="0"/>
-                    </a:p>
-                  </a:txBody>
-                  <a:tcPr/>
-                </a:tc>
-                <a:tc>
-                  <a:txBody>
-                    <a:bodyPr/>
-                    <a:lstStyle/>
-                    <a:p>
-                      <a:pPr algn="ctr"/>
-                      <a:r>
-                        <a:rPr lang="es-MX" sz="1400" dirty="0"/>
-                        <a:t>Sí</a:t>
-                      </a:r>
-                      <a:endParaRPr lang="es-CO" sz="1400" dirty="0"/>
-                    </a:p>
-                  </a:txBody>
-                  <a:tcPr/>
-                </a:tc>
-                <a:tc>
-                  <a:txBody>
-                    <a:bodyPr/>
-                    <a:lstStyle/>
-                    <a:p>
-                      <a:pPr algn="ctr"/>
-                      <a:r>
-                        <a:rPr lang="es-MX" sz="1400" dirty="0"/>
-                        <a:t>1</a:t>
-                      </a:r>
-                      <a:endParaRPr lang="es-CO" sz="1400" dirty="0"/>
-                    </a:p>
-                  </a:txBody>
-                  <a:tcPr/>
-                </a:tc>
-                <a:extLst>
-                  <a:ext uri="{0D108BD9-81ED-4DB2-BD59-A6C34878D82A}">
-                    <a16:rowId xmlns:a16="http://schemas.microsoft.com/office/drawing/2014/main" val="3913384185"/>
-                  </a:ext>
-                </a:extLst>
-              </a:tr>
-              <a:tr h="0">
-                <a:tc>
-                  <a:txBody>
-                    <a:bodyPr/>
-                    <a:lstStyle/>
-                    <a:p>
-                      <a:pPr algn="ctr"/>
-                      <a:r>
-                        <a:rPr lang="es-CO" sz="1400" dirty="0"/>
-                        <a:t>2</a:t>
-                      </a:r>
-                    </a:p>
-                  </a:txBody>
-                  <a:tcPr/>
-                </a:tc>
-                <a:tc>
-                  <a:txBody>
-                    <a:bodyPr/>
-                    <a:lstStyle/>
-                    <a:p>
-                      <a:pPr algn="ctr"/>
-                      <a:r>
-                        <a:rPr lang="es-MX" sz="1400" dirty="0"/>
-                        <a:t>Sí</a:t>
-                      </a:r>
-                      <a:endParaRPr lang="es-CO" sz="1400" dirty="0"/>
-                    </a:p>
-                  </a:txBody>
-                  <a:tcPr/>
-                </a:tc>
-                <a:tc>
-                  <a:txBody>
-                    <a:bodyPr/>
-                    <a:lstStyle/>
-                    <a:p>
-                      <a:pPr algn="ctr"/>
-                      <a:r>
-                        <a:rPr lang="es-MX" sz="1400" dirty="0"/>
-                        <a:t>No</a:t>
-                      </a:r>
-                      <a:endParaRPr lang="es-CO" sz="1400" dirty="0"/>
-                    </a:p>
-                  </a:txBody>
-                  <a:tcPr/>
-                </a:tc>
-                <a:tc>
-                  <a:txBody>
-                    <a:bodyPr/>
-                    <a:lstStyle/>
-                    <a:p>
-                      <a:pPr algn="ctr"/>
-                      <a:r>
-                        <a:rPr lang="es-MX" sz="1400" dirty="0"/>
-                        <a:t>1</a:t>
-                      </a:r>
-                      <a:endParaRPr lang="es-CO" sz="1400" dirty="0"/>
-                    </a:p>
-                  </a:txBody>
-                  <a:tcPr/>
-                </a:tc>
-                <a:extLst>
-                  <a:ext uri="{0D108BD9-81ED-4DB2-BD59-A6C34878D82A}">
-                    <a16:rowId xmlns:a16="http://schemas.microsoft.com/office/drawing/2014/main" val="472616589"/>
-                  </a:ext>
-                </a:extLst>
-              </a:tr>
-              <a:tr h="301014">
-                <a:tc>
-                  <a:txBody>
-                    <a:bodyPr/>
-                    <a:lstStyle/>
-                    <a:p>
-                      <a:pPr algn="ctr"/>
-                      <a:r>
-                        <a:rPr lang="es-CO" sz="1400" dirty="0"/>
-                        <a:t>3</a:t>
-                      </a:r>
-                    </a:p>
-                  </a:txBody>
-                  <a:tcPr/>
-                </a:tc>
-                <a:tc>
-                  <a:txBody>
-                    <a:bodyPr/>
-                    <a:lstStyle/>
-                    <a:p>
-                      <a:pPr algn="ctr"/>
-                      <a:r>
-                        <a:rPr lang="es-MX" sz="1400" dirty="0"/>
-                        <a:t>No</a:t>
-                      </a:r>
-                      <a:endParaRPr lang="es-CO" sz="1400" dirty="0"/>
-                    </a:p>
-                  </a:txBody>
-                  <a:tcPr/>
-                </a:tc>
-                <a:tc>
-                  <a:txBody>
-                    <a:bodyPr/>
-                    <a:lstStyle/>
-                    <a:p>
-                      <a:pPr algn="ctr"/>
-                      <a:r>
-                        <a:rPr lang="es-MX" sz="1400" dirty="0"/>
-                        <a:t>Sí</a:t>
-                      </a:r>
-                      <a:endParaRPr lang="es-CO" sz="1400" dirty="0"/>
-                    </a:p>
-                  </a:txBody>
-                  <a:tcPr/>
-                </a:tc>
-                <a:tc>
-                  <a:txBody>
-                    <a:bodyPr/>
-                    <a:lstStyle/>
-                    <a:p>
-                      <a:pPr algn="ctr"/>
-                      <a:r>
-                        <a:rPr lang="es-MX" sz="1400" dirty="0"/>
-                        <a:t>1</a:t>
-                      </a:r>
-                      <a:endParaRPr lang="es-CO" sz="1400" dirty="0"/>
-                    </a:p>
-                  </a:txBody>
-                  <a:tcPr/>
-                </a:tc>
-                <a:extLst>
-                  <a:ext uri="{0D108BD9-81ED-4DB2-BD59-A6C34878D82A}">
-                    <a16:rowId xmlns:a16="http://schemas.microsoft.com/office/drawing/2014/main" val="3444655683"/>
-                  </a:ext>
-                </a:extLst>
-              </a:tr>
-              <a:tr h="301014">
-                <a:tc>
-                  <a:txBody>
-                    <a:bodyPr/>
-                    <a:lstStyle/>
-                    <a:p>
-                      <a:pPr algn="ctr"/>
-                      <a:r>
-                        <a:rPr lang="es-CO" sz="1400" dirty="0"/>
-                        <a:t>4</a:t>
-                      </a:r>
-                    </a:p>
-                  </a:txBody>
-                  <a:tcPr/>
-                </a:tc>
-                <a:tc>
-                  <a:txBody>
-                    <a:bodyPr/>
-                    <a:lstStyle/>
-                    <a:p>
-                      <a:pPr algn="ctr"/>
-                      <a:r>
-                        <a:rPr lang="es-MX" sz="1400" dirty="0"/>
-                        <a:t>No</a:t>
-                      </a:r>
-                      <a:endParaRPr lang="es-CO" sz="1400" dirty="0"/>
-                    </a:p>
-                  </a:txBody>
-                  <a:tcPr/>
-                </a:tc>
-                <a:tc>
-                  <a:txBody>
-                    <a:bodyPr/>
-                    <a:lstStyle/>
-                    <a:p>
-                      <a:pPr algn="ctr"/>
-                      <a:r>
-                        <a:rPr lang="es-MX" sz="1400" dirty="0"/>
-                        <a:t>No</a:t>
-                      </a:r>
-                      <a:endParaRPr lang="es-CO" sz="1400" dirty="0"/>
-                    </a:p>
-                  </a:txBody>
-                  <a:tcPr/>
-                </a:tc>
-                <a:tc>
-                  <a:txBody>
-                    <a:bodyPr/>
-                    <a:lstStyle/>
-                    <a:p>
-                      <a:pPr algn="ctr"/>
-                      <a:r>
-                        <a:rPr lang="es-MX" sz="1400" dirty="0"/>
-                        <a:t>0</a:t>
-                      </a:r>
-                      <a:endParaRPr lang="es-CO" sz="1400" dirty="0"/>
-                    </a:p>
-                  </a:txBody>
-                  <a:tcPr/>
-                </a:tc>
-                <a:extLst>
-                  <a:ext uri="{0D108BD9-81ED-4DB2-BD59-A6C34878D82A}">
-                    <a16:rowId xmlns:a16="http://schemas.microsoft.com/office/drawing/2014/main" val="1589326007"/>
-                  </a:ext>
-                </a:extLst>
-              </a:tr>
-            </a:tbl>
-          </a:graphicData>
-        </a:graphic>
-      </p:graphicFrame>
-      <p:sp>
-        <p:nvSpPr>
-          <p:cNvPr id="6" name="Subtítulo 2">
-            <a:extLst>
-              <a:ext uri="{FF2B5EF4-FFF2-40B4-BE49-F238E27FC236}">
-                <a16:creationId xmlns:a16="http://schemas.microsoft.com/office/drawing/2014/main" id="{80AD4573-4A46-F880-0F4B-7D50A266C0BC}"/>
-              </a:ext>
-            </a:extLst>
-          </p:cNvPr>
-          <p:cNvSpPr txBox="1">
-            <a:spLocks/>
-          </p:cNvSpPr>
-          <p:nvPr/>
-        </p:nvSpPr>
-        <p:spPr>
-          <a:xfrm>
-            <a:off x="345232" y="2436254"/>
-            <a:ext cx="8406881" cy="4108580"/>
-          </a:xfrm>
-          <a:prstGeom prst="rect">
-            <a:avLst/>
-          </a:prstGeom>
-        </p:spPr>
-        <p:txBody>
-          <a:bodyPr vert="horz" lIns="91440" tIns="45720" rIns="91440" bIns="45720" rtlCol="0">
-            <a:normAutofit/>
-          </a:bodyPr>
-          <a:lstStyle>
-            <a:lvl1pPr marL="0" indent="0" algn="ctr" defTabSz="457200" rtl="0" eaLnBrk="1" latinLnBrk="0" hangingPunct="1">
-              <a:spcBef>
-                <a:spcPct val="20000"/>
-              </a:spcBef>
-              <a:buFont typeface="Arial"/>
-              <a:buNone/>
-              <a:defRPr sz="3200" kern="1200">
-                <a:solidFill>
-                  <a:schemeClr val="tx1">
-                    <a:tint val="75000"/>
-                  </a:schemeClr>
-                </a:solidFill>
-                <a:latin typeface="+mn-lt"/>
-                <a:ea typeface="+mn-ea"/>
-                <a:cs typeface="+mn-cs"/>
-              </a:defRPr>
-            </a:lvl1pPr>
-            <a:lvl2pPr marL="457200" indent="0" algn="ctr" defTabSz="457200" rtl="0" eaLnBrk="1" latinLnBrk="0" hangingPunct="1">
-              <a:spcBef>
-                <a:spcPct val="20000"/>
-              </a:spcBef>
-              <a:buFont typeface="Arial"/>
-              <a:buNone/>
-              <a:defRPr sz="2800" kern="1200">
-                <a:solidFill>
-                  <a:schemeClr val="tx1">
-                    <a:tint val="75000"/>
-                  </a:schemeClr>
-                </a:solidFill>
-                <a:latin typeface="+mn-lt"/>
-                <a:ea typeface="+mn-ea"/>
-                <a:cs typeface="+mn-cs"/>
-              </a:defRPr>
-            </a:lvl2pPr>
-            <a:lvl3pPr marL="914400" indent="0" algn="ctr" defTabSz="457200" rtl="0" eaLnBrk="1" latinLnBrk="0" hangingPunct="1">
-              <a:spcBef>
-                <a:spcPct val="20000"/>
-              </a:spcBef>
-              <a:buFont typeface="Arial"/>
-              <a:buNone/>
-              <a:defRPr sz="2400" kern="1200">
-                <a:solidFill>
-                  <a:schemeClr val="tx1">
-                    <a:tint val="75000"/>
-                  </a:schemeClr>
-                </a:solidFill>
-                <a:latin typeface="+mn-lt"/>
-                <a:ea typeface="+mn-ea"/>
-                <a:cs typeface="+mn-cs"/>
-              </a:defRPr>
-            </a:lvl3pPr>
-            <a:lvl4pPr marL="1371600" indent="0" algn="ctr" defTabSz="457200" rtl="0" eaLnBrk="1" latinLnBrk="0" hangingPunct="1">
-              <a:spcBef>
-                <a:spcPct val="20000"/>
-              </a:spcBef>
-              <a:buFont typeface="Arial"/>
-              <a:buNone/>
-              <a:defRPr sz="2000" kern="1200">
-                <a:solidFill>
-                  <a:schemeClr val="tx1">
-                    <a:tint val="75000"/>
-                  </a:schemeClr>
-                </a:solidFill>
-                <a:latin typeface="+mn-lt"/>
-                <a:ea typeface="+mn-ea"/>
-                <a:cs typeface="+mn-cs"/>
-              </a:defRPr>
-            </a:lvl4pPr>
-            <a:lvl5pPr marL="1828800" indent="0" algn="ctr" defTabSz="457200" rtl="0" eaLnBrk="1" latinLnBrk="0" hangingPunct="1">
-              <a:spcBef>
-                <a:spcPct val="20000"/>
-              </a:spcBef>
-              <a:buFont typeface="Arial"/>
-              <a:buNone/>
-              <a:defRPr sz="2000" kern="1200">
-                <a:solidFill>
-                  <a:schemeClr val="tx1">
-                    <a:tint val="75000"/>
-                  </a:schemeClr>
-                </a:solidFill>
-                <a:latin typeface="+mn-lt"/>
-                <a:ea typeface="+mn-ea"/>
-                <a:cs typeface="+mn-cs"/>
-              </a:defRPr>
-            </a:lvl5pPr>
-            <a:lvl6pPr marL="2286000" indent="0" algn="ctr" defTabSz="457200" rtl="0" eaLnBrk="1" latinLnBrk="0" hangingPunct="1">
-              <a:spcBef>
-                <a:spcPct val="20000"/>
-              </a:spcBef>
-              <a:buFont typeface="Arial"/>
-              <a:buNone/>
-              <a:defRPr sz="2000" kern="1200">
-                <a:solidFill>
-                  <a:schemeClr val="tx1">
-                    <a:tint val="75000"/>
-                  </a:schemeClr>
-                </a:solidFill>
-                <a:latin typeface="+mn-lt"/>
-                <a:ea typeface="+mn-ea"/>
-                <a:cs typeface="+mn-cs"/>
-              </a:defRPr>
-            </a:lvl6pPr>
-            <a:lvl7pPr marL="2743200" indent="0" algn="ctr" defTabSz="457200" rtl="0" eaLnBrk="1" latinLnBrk="0" hangingPunct="1">
-              <a:spcBef>
-                <a:spcPct val="20000"/>
-              </a:spcBef>
-              <a:buFont typeface="Arial"/>
-              <a:buNone/>
-              <a:defRPr sz="2000" kern="1200">
-                <a:solidFill>
-                  <a:schemeClr val="tx1">
-                    <a:tint val="75000"/>
-                  </a:schemeClr>
-                </a:solidFill>
-                <a:latin typeface="+mn-lt"/>
-                <a:ea typeface="+mn-ea"/>
-                <a:cs typeface="+mn-cs"/>
-              </a:defRPr>
-            </a:lvl7pPr>
-            <a:lvl8pPr marL="3200400" indent="0" algn="ctr" defTabSz="457200" rtl="0" eaLnBrk="1" latinLnBrk="0" hangingPunct="1">
-              <a:spcBef>
-                <a:spcPct val="20000"/>
-              </a:spcBef>
-              <a:buFont typeface="Arial"/>
-              <a:buNone/>
-              <a:defRPr sz="2000" kern="1200">
-                <a:solidFill>
-                  <a:schemeClr val="tx1">
-                    <a:tint val="75000"/>
-                  </a:schemeClr>
-                </a:solidFill>
-                <a:latin typeface="+mn-lt"/>
-                <a:ea typeface="+mn-ea"/>
-                <a:cs typeface="+mn-cs"/>
-              </a:defRPr>
-            </a:lvl8pPr>
-            <a:lvl9pPr marL="3657600" indent="0" algn="ctr" defTabSz="457200" rtl="0" eaLnBrk="1" latinLnBrk="0" hangingPunct="1">
-              <a:spcBef>
-                <a:spcPct val="20000"/>
-              </a:spcBef>
-              <a:buFont typeface="Arial"/>
-              <a:buNone/>
-              <a:defRPr sz="2000" kern="1200">
-                <a:solidFill>
-                  <a:schemeClr val="tx1">
-                    <a:tint val="75000"/>
-                  </a:schemeClr>
-                </a:solidFill>
-                <a:latin typeface="+mn-lt"/>
-                <a:ea typeface="+mn-ea"/>
-                <a:cs typeface="+mn-cs"/>
-              </a:defRPr>
-            </a:lvl9pPr>
-          </a:lstStyle>
-          <a:p>
-            <a:pPr algn="l">
-              <a:lnSpc>
-                <a:spcPts val="1425"/>
-              </a:lnSpc>
-            </a:pPr>
-            <a:endParaRPr lang="es-CO" dirty="0"/>
-          </a:p>
-          <a:p>
-            <a:pPr algn="l">
-              <a:lnSpc>
-                <a:spcPts val="1425"/>
-              </a:lnSpc>
-            </a:pPr>
-            <a:endParaRPr lang="es-CO" dirty="0"/>
-          </a:p>
-          <a:p>
-            <a:pPr algn="l">
-              <a:lnSpc>
-                <a:spcPts val="1425"/>
-              </a:lnSpc>
-            </a:pPr>
-            <a:endParaRPr lang="es-CO" dirty="0"/>
-          </a:p>
-          <a:p>
-            <a:pPr algn="l">
-              <a:lnSpc>
-                <a:spcPts val="1425"/>
-              </a:lnSpc>
-            </a:pPr>
-            <a:endParaRPr lang="es-CO" dirty="0"/>
-          </a:p>
-          <a:p>
-            <a:pPr algn="l">
-              <a:lnSpc>
-                <a:spcPts val="1425"/>
-              </a:lnSpc>
-            </a:pPr>
-            <a:endParaRPr lang="es-CO" dirty="0"/>
-          </a:p>
-          <a:p>
-            <a:pPr algn="l">
-              <a:lnSpc>
-                <a:spcPts val="1425"/>
-              </a:lnSpc>
-            </a:pPr>
-            <a:endParaRPr lang="es-CO" dirty="0"/>
-          </a:p>
-        </p:txBody>
-      </p:sp>
-      <p:sp>
-        <p:nvSpPr>
-          <p:cNvPr id="7" name="Subtítulo 2">
-            <a:extLst>
-              <a:ext uri="{FF2B5EF4-FFF2-40B4-BE49-F238E27FC236}">
-                <a16:creationId xmlns:a16="http://schemas.microsoft.com/office/drawing/2014/main" id="{1DFF3C25-FDF7-7D79-539B-1BA1CFFA98D1}"/>
-              </a:ext>
-            </a:extLst>
-          </p:cNvPr>
-          <p:cNvSpPr txBox="1">
-            <a:spLocks/>
-          </p:cNvSpPr>
-          <p:nvPr/>
-        </p:nvSpPr>
-        <p:spPr>
-          <a:xfrm>
-            <a:off x="307905" y="4808375"/>
-            <a:ext cx="8406881" cy="1956319"/>
-          </a:xfrm>
-          <a:prstGeom prst="rect">
-            <a:avLst/>
-          </a:prstGeom>
-        </p:spPr>
-        <p:txBody>
-          <a:bodyPr vert="horz" lIns="91440" tIns="45720" rIns="91440" bIns="45720" rtlCol="0">
-            <a:normAutofit/>
-          </a:bodyPr>
-          <a:lstStyle>
-            <a:lvl1pPr marL="0" indent="0" algn="ctr" defTabSz="457200" rtl="0" eaLnBrk="1" latinLnBrk="0" hangingPunct="1">
-              <a:spcBef>
-                <a:spcPct val="20000"/>
-              </a:spcBef>
-              <a:buFont typeface="Arial"/>
-              <a:buNone/>
-              <a:defRPr sz="3200" kern="1200">
-                <a:solidFill>
-                  <a:schemeClr val="tx1">
-                    <a:tint val="75000"/>
-                  </a:schemeClr>
-                </a:solidFill>
-                <a:latin typeface="+mn-lt"/>
-                <a:ea typeface="+mn-ea"/>
-                <a:cs typeface="+mn-cs"/>
-              </a:defRPr>
-            </a:lvl1pPr>
-            <a:lvl2pPr marL="457200" indent="0" algn="ctr" defTabSz="457200" rtl="0" eaLnBrk="1" latinLnBrk="0" hangingPunct="1">
-              <a:spcBef>
-                <a:spcPct val="20000"/>
-              </a:spcBef>
-              <a:buFont typeface="Arial"/>
-              <a:buNone/>
-              <a:defRPr sz="2800" kern="1200">
-                <a:solidFill>
-                  <a:schemeClr val="tx1">
-                    <a:tint val="75000"/>
-                  </a:schemeClr>
-                </a:solidFill>
-                <a:latin typeface="+mn-lt"/>
-                <a:ea typeface="+mn-ea"/>
-                <a:cs typeface="+mn-cs"/>
-              </a:defRPr>
-            </a:lvl2pPr>
-            <a:lvl3pPr marL="914400" indent="0" algn="ctr" defTabSz="457200" rtl="0" eaLnBrk="1" latinLnBrk="0" hangingPunct="1">
-              <a:spcBef>
-                <a:spcPct val="20000"/>
-              </a:spcBef>
-              <a:buFont typeface="Arial"/>
-              <a:buNone/>
-              <a:defRPr sz="2400" kern="1200">
-                <a:solidFill>
-                  <a:schemeClr val="tx1">
-                    <a:tint val="75000"/>
-                  </a:schemeClr>
-                </a:solidFill>
-                <a:latin typeface="+mn-lt"/>
-                <a:ea typeface="+mn-ea"/>
-                <a:cs typeface="+mn-cs"/>
-              </a:defRPr>
-            </a:lvl3pPr>
-            <a:lvl4pPr marL="1371600" indent="0" algn="ctr" defTabSz="457200" rtl="0" eaLnBrk="1" latinLnBrk="0" hangingPunct="1">
-              <a:spcBef>
-                <a:spcPct val="20000"/>
-              </a:spcBef>
-              <a:buFont typeface="Arial"/>
-              <a:buNone/>
-              <a:defRPr sz="2000" kern="1200">
-                <a:solidFill>
-                  <a:schemeClr val="tx1">
-                    <a:tint val="75000"/>
-                  </a:schemeClr>
-                </a:solidFill>
-                <a:latin typeface="+mn-lt"/>
-                <a:ea typeface="+mn-ea"/>
-                <a:cs typeface="+mn-cs"/>
-              </a:defRPr>
-            </a:lvl4pPr>
-            <a:lvl5pPr marL="1828800" indent="0" algn="ctr" defTabSz="457200" rtl="0" eaLnBrk="1" latinLnBrk="0" hangingPunct="1">
-              <a:spcBef>
-                <a:spcPct val="20000"/>
-              </a:spcBef>
-              <a:buFont typeface="Arial"/>
-              <a:buNone/>
-              <a:defRPr sz="2000" kern="1200">
-                <a:solidFill>
-                  <a:schemeClr val="tx1">
-                    <a:tint val="75000"/>
-                  </a:schemeClr>
-                </a:solidFill>
-                <a:latin typeface="+mn-lt"/>
-                <a:ea typeface="+mn-ea"/>
-                <a:cs typeface="+mn-cs"/>
-              </a:defRPr>
-            </a:lvl5pPr>
-            <a:lvl6pPr marL="2286000" indent="0" algn="ctr" defTabSz="457200" rtl="0" eaLnBrk="1" latinLnBrk="0" hangingPunct="1">
-              <a:spcBef>
-                <a:spcPct val="20000"/>
-              </a:spcBef>
-              <a:buFont typeface="Arial"/>
-              <a:buNone/>
-              <a:defRPr sz="2000" kern="1200">
-                <a:solidFill>
-                  <a:schemeClr val="tx1">
-                    <a:tint val="75000"/>
-                  </a:schemeClr>
-                </a:solidFill>
-                <a:latin typeface="+mn-lt"/>
-                <a:ea typeface="+mn-ea"/>
-                <a:cs typeface="+mn-cs"/>
-              </a:defRPr>
-            </a:lvl6pPr>
-            <a:lvl7pPr marL="2743200" indent="0" algn="ctr" defTabSz="457200" rtl="0" eaLnBrk="1" latinLnBrk="0" hangingPunct="1">
-              <a:spcBef>
-                <a:spcPct val="20000"/>
-              </a:spcBef>
-              <a:buFont typeface="Arial"/>
-              <a:buNone/>
-              <a:defRPr sz="2000" kern="1200">
-                <a:solidFill>
-                  <a:schemeClr val="tx1">
-                    <a:tint val="75000"/>
-                  </a:schemeClr>
-                </a:solidFill>
-                <a:latin typeface="+mn-lt"/>
-                <a:ea typeface="+mn-ea"/>
-                <a:cs typeface="+mn-cs"/>
-              </a:defRPr>
-            </a:lvl7pPr>
-            <a:lvl8pPr marL="3200400" indent="0" algn="ctr" defTabSz="457200" rtl="0" eaLnBrk="1" latinLnBrk="0" hangingPunct="1">
-              <a:spcBef>
-                <a:spcPct val="20000"/>
-              </a:spcBef>
-              <a:buFont typeface="Arial"/>
-              <a:buNone/>
-              <a:defRPr sz="2000" kern="1200">
-                <a:solidFill>
-                  <a:schemeClr val="tx1">
-                    <a:tint val="75000"/>
-                  </a:schemeClr>
-                </a:solidFill>
-                <a:latin typeface="+mn-lt"/>
-                <a:ea typeface="+mn-ea"/>
-                <a:cs typeface="+mn-cs"/>
-              </a:defRPr>
-            </a:lvl8pPr>
-            <a:lvl9pPr marL="3657600" indent="0" algn="ctr" defTabSz="457200" rtl="0" eaLnBrk="1" latinLnBrk="0" hangingPunct="1">
-              <a:spcBef>
-                <a:spcPct val="20000"/>
-              </a:spcBef>
-              <a:buFont typeface="Arial"/>
-              <a:buNone/>
-              <a:defRPr sz="2000" kern="1200">
-                <a:solidFill>
-                  <a:schemeClr val="tx1">
-                    <a:tint val="75000"/>
-                  </a:schemeClr>
-                </a:solidFill>
-                <a:latin typeface="+mn-lt"/>
-                <a:ea typeface="+mn-ea"/>
-                <a:cs typeface="+mn-cs"/>
-              </a:defRPr>
-            </a:lvl9pPr>
-          </a:lstStyle>
-          <a:p>
-            <a:pPr algn="l">
-              <a:lnSpc>
-                <a:spcPts val="1425"/>
-              </a:lnSpc>
-            </a:pPr>
-            <a:r>
-              <a:rPr lang="es-ES" sz="1600" dirty="0">
-                <a:solidFill>
-                  <a:schemeClr val="tx1"/>
-                </a:solidFill>
-              </a:rPr>
-              <a:t>Caso 1: El analista detecta un error claro en el consumo y lo ajusta sin necesidad de verificación en terreno.</a:t>
-            </a:r>
-          </a:p>
-          <a:p>
-            <a:pPr algn="l">
-              <a:lnSpc>
-                <a:spcPts val="1425"/>
-              </a:lnSpc>
-            </a:pPr>
-            <a:r>
-              <a:rPr lang="es-ES" sz="1600" dirty="0">
-                <a:solidFill>
-                  <a:schemeClr val="tx1"/>
-                </a:solidFill>
-              </a:rPr>
-              <a:t>Caso 2: El analista ajusta parcialmente el consumo, pero requiere una visita en terreno para validar la parte restante antes de decidir su facturación definitiva.</a:t>
-            </a:r>
-          </a:p>
-          <a:p>
-            <a:pPr algn="l">
-              <a:lnSpc>
-                <a:spcPts val="1425"/>
-              </a:lnSpc>
-            </a:pPr>
-            <a:r>
-              <a:rPr lang="es-ES" sz="1600" dirty="0">
-                <a:solidFill>
-                  <a:schemeClr val="tx1"/>
-                </a:solidFill>
-              </a:rPr>
-              <a:t>Caso 3: El analista no ajusta el consumo por falta de evidencia suficiente, pero mantiene dudas que requieren una inspección en terreno.</a:t>
-            </a:r>
-          </a:p>
-          <a:p>
-            <a:pPr algn="l">
-              <a:lnSpc>
-                <a:spcPts val="1425"/>
-              </a:lnSpc>
-            </a:pPr>
-            <a:r>
-              <a:rPr lang="es-ES" sz="1600" dirty="0">
-                <a:solidFill>
-                  <a:schemeClr val="tx1"/>
-                </a:solidFill>
-              </a:rPr>
-              <a:t>Caso 4: El consumo investigado es considerado válido y no necesita ajustes ni verificación en terreno.</a:t>
-            </a:r>
-            <a:br>
-              <a:rPr lang="es-ES" sz="1200" dirty="0">
-                <a:solidFill>
-                  <a:schemeClr val="tx1"/>
-                </a:solidFill>
-              </a:rPr>
-            </a:br>
-            <a:endParaRPr lang="es-ES" sz="1200" dirty="0">
-              <a:solidFill>
-                <a:schemeClr val="tx1"/>
-              </a:solidFill>
-            </a:endParaRPr>
-          </a:p>
-          <a:p>
-            <a:pPr algn="l">
-              <a:lnSpc>
-                <a:spcPts val="1425"/>
-              </a:lnSpc>
-            </a:pPr>
-            <a:endParaRPr lang="es-CO" dirty="0"/>
-          </a:p>
-          <a:p>
-            <a:pPr algn="l">
-              <a:lnSpc>
-                <a:spcPts val="1425"/>
-              </a:lnSpc>
-            </a:pPr>
-            <a:endParaRPr lang="es-CO" dirty="0"/>
-          </a:p>
-          <a:p>
-            <a:pPr algn="l">
-              <a:lnSpc>
-                <a:spcPts val="1425"/>
-              </a:lnSpc>
-            </a:pPr>
-            <a:endParaRPr lang="es-CO" dirty="0"/>
-          </a:p>
-          <a:p>
-            <a:pPr algn="l">
-              <a:lnSpc>
-                <a:spcPts val="1425"/>
-              </a:lnSpc>
-            </a:pPr>
-            <a:endParaRPr lang="es-CO" dirty="0"/>
-          </a:p>
-          <a:p>
-            <a:pPr algn="l">
-              <a:lnSpc>
-                <a:spcPts val="1425"/>
-              </a:lnSpc>
-            </a:pPr>
-            <a:endParaRPr lang="es-CO" dirty="0"/>
-          </a:p>
-          <a:p>
-            <a:pPr algn="l">
-              <a:lnSpc>
-                <a:spcPts val="1425"/>
-              </a:lnSpc>
-            </a:pPr>
-            <a:endParaRPr lang="es-CO" dirty="0"/>
-          </a:p>
-          <a:p>
-            <a:pPr algn="l">
-              <a:lnSpc>
-                <a:spcPts val="1425"/>
-              </a:lnSpc>
-            </a:pPr>
-            <a:endParaRPr lang="es-CO" dirty="0"/>
-          </a:p>
-          <a:p>
-            <a:pPr algn="l">
-              <a:lnSpc>
-                <a:spcPts val="1425"/>
-              </a:lnSpc>
-            </a:pPr>
-            <a:endParaRPr lang="es-CO" dirty="0"/>
-          </a:p>
-          <a:p>
-            <a:pPr algn="l">
-              <a:lnSpc>
-                <a:spcPts val="1425"/>
-              </a:lnSpc>
-            </a:pPr>
-            <a:endParaRPr lang="es-CO" dirty="0"/>
-          </a:p>
-          <a:p>
-            <a:pPr algn="l">
-              <a:lnSpc>
-                <a:spcPts val="1425"/>
-              </a:lnSpc>
-            </a:pPr>
-            <a:endParaRPr lang="es-CO" dirty="0"/>
-          </a:p>
-        </p:txBody>
-      </p:sp>
-    </p:spTree>
-    <p:extLst>
-      <p:ext uri="{BB962C8B-B14F-4D97-AF65-F5344CB8AC3E}">
-        <p14:creationId xmlns:p14="http://schemas.microsoft.com/office/powerpoint/2010/main" val="1633660020"/>
-      </p:ext>
-    </p:extLst>
-  </p:cSld>
-  <p:clrMapOvr>
-    <a:masterClrMapping/>
-  </p:clrMapOvr>
-</p:sld>
-</file>
-
-<file path=ppt/slides/slide6.xml><?xml version="1.0" encoding="utf-8"?>
-<p:sld xmlns:a="http://schemas.openxmlformats.org/drawingml/2006/main" xmlns:r="http://schemas.openxmlformats.org/officeDocument/2006/relationships" xmlns:p="http://schemas.openxmlformats.org/presentationml/2006/main">
-  <p:cSld>
-    <p:spTree>
-      <p:nvGrpSpPr>
-        <p:cNvPr id="1" name=""/>
-        <p:cNvGrpSpPr/>
-        <p:nvPr/>
-      </p:nvGrpSpPr>
-      <p:grpSpPr>
-        <a:xfrm>
-          <a:off x="0" y="0"/>
-          <a:ext cx="0" cy="0"/>
-          <a:chOff x="0" y="0"/>
-          <a:chExt cx="0" cy="0"/>
-        </a:xfrm>
-      </p:grpSpPr>
-      <p:sp>
-        <p:nvSpPr>
-          <p:cNvPr id="2" name="Título 1">
-            <a:extLst>
-              <a:ext uri="{FF2B5EF4-FFF2-40B4-BE49-F238E27FC236}">
                 <a16:creationId xmlns:a16="http://schemas.microsoft.com/office/drawing/2014/main" id="{72C53D3D-D727-FA71-9344-6999C523AD04}"/>
               </a:ext>
             </a:extLst>
@@ -22611,12 +20835,9 @@
               <a:rPr lang="es-CO" sz="2800" b="1" dirty="0">
                 <a:effectLst/>
               </a:rPr>
-              <a:t>Variables Predictoras</a:t>
-            </a:r>
-            <a:r>
-              <a:rPr lang="es-CO" sz="2800" b="1" dirty="0"/>
-              <a:t>.</a:t>
-            </a:r>
+              <a:t>Descripción de los Datos</a:t>
+            </a:r>
+            <a:endParaRPr lang="es-CO" sz="2800" b="1" dirty="0"/>
           </a:p>
         </p:txBody>
       </p:sp>
@@ -22638,53 +20859,15 @@
         </p:nvSpPr>
         <p:spPr>
           <a:xfrm>
-            <a:off x="541180" y="4945224"/>
-            <a:ext cx="7548461" cy="1576874"/>
+            <a:off x="541179" y="5181777"/>
+            <a:ext cx="7548461" cy="385963"/>
           </a:xfrm>
         </p:spPr>
         <p:txBody>
           <a:bodyPr>
-            <a:normAutofit lnSpcReduction="10000"/>
+            <a:normAutofit/>
           </a:bodyPr>
           <a:lstStyle/>
-          <a:p>
-            <a:pPr algn="just"/>
-            <a:r>
-              <a:rPr lang="es-ES" sz="1500" dirty="0">
-                <a:solidFill>
-                  <a:schemeClr val="tx1"/>
-                </a:solidFill>
-                <a:effectLst/>
-              </a:rPr>
-              <a:t>Estas columnas del </a:t>
-            </a:r>
-            <a:r>
-              <a:rPr lang="es-ES" sz="1500" dirty="0" err="1">
-                <a:solidFill>
-                  <a:schemeClr val="tx1"/>
-                </a:solidFill>
-                <a:effectLst/>
-              </a:rPr>
-              <a:t>dataset</a:t>
-            </a:r>
-            <a:r>
-              <a:rPr lang="es-ES" sz="1500" dirty="0">
-                <a:solidFill>
-                  <a:schemeClr val="tx1"/>
-                </a:solidFill>
-                <a:effectLst/>
-              </a:rPr>
-              <a:t> representan condiciones observadas por el analista en el momento de tomar la decisión, y serán utilizadas como variables predictoras en el modelo.</a:t>
-            </a:r>
-          </a:p>
-          <a:p>
-            <a:pPr algn="just"/>
-            <a:endParaRPr lang="es-CO" sz="1500" dirty="0">
-              <a:solidFill>
-                <a:schemeClr val="tx1"/>
-              </a:solidFill>
-            </a:endParaRPr>
-          </a:p>
           <a:p>
             <a:pPr algn="just"/>
             <a:r>
@@ -22701,28 +20884,6 @@
                 <a:schemeClr val="tx1"/>
               </a:solidFill>
             </a:endParaRPr>
-          </a:p>
-          <a:p>
-            <a:pPr algn="just"/>
-            <a:r>
-              <a:rPr lang="es-CO" sz="1500" dirty="0">
-                <a:solidFill>
-                  <a:schemeClr val="tx1"/>
-                </a:solidFill>
-              </a:rPr>
-              <a:t>Variable predicha: RESPUESTA </a:t>
-            </a:r>
-          </a:p>
-          <a:p>
-            <a:pPr algn="just"/>
-            <a:r>
-              <a:rPr lang="es-ES" sz="1500" dirty="0">
-                <a:solidFill>
-                  <a:schemeClr val="tx1"/>
-                </a:solidFill>
-              </a:rPr>
-              <a:t>1 = Se tomó acción, 0 = No se tomó ninguna acción</a:t>
-            </a:r>
           </a:p>
           <a:p>
             <a:pPr algn="just"/>
@@ -22799,14 +20960,14 @@
           <p:nvPr>
             <p:extLst>
               <p:ext uri="{D42A27DB-BD31-4B8C-83A1-F6EECF244321}">
-                <p14:modId xmlns:p14="http://schemas.microsoft.com/office/powerpoint/2010/main" val="569127529"/>
+                <p14:modId xmlns:p14="http://schemas.microsoft.com/office/powerpoint/2010/main" val="3973891811"/>
               </p:ext>
             </p:extLst>
           </p:nvPr>
         </p:nvGraphicFramePr>
         <p:xfrm>
           <a:off x="541180" y="1290260"/>
-          <a:ext cx="7548461" cy="3421524"/>
+          <a:ext cx="7548461" cy="3722538"/>
         </p:xfrm>
         <a:graphic>
           <a:graphicData uri="http://schemas.openxmlformats.org/drawingml/2006/table">
@@ -23508,6 +21669,91 @@
                   </a:ext>
                 </a:extLst>
               </a:tr>
+              <a:tr h="301014">
+                <a:tc>
+                  <a:txBody>
+                    <a:bodyPr/>
+                    <a:lstStyle/>
+                    <a:p>
+                      <a:pPr algn="l"/>
+                      <a:r>
+                        <a:rPr lang="es-ES" sz="1000" dirty="0">
+                          <a:latin typeface="+mn-lt"/>
+                        </a:rPr>
+                        <a:t>RESPUESTA</a:t>
+                      </a:r>
+                      <a:endParaRPr lang="es-CO" sz="1000" dirty="0">
+                        <a:latin typeface="+mn-lt"/>
+                      </a:endParaRPr>
+                    </a:p>
+                  </a:txBody>
+                  <a:tcPr>
+                    <a:solidFill>
+                      <a:schemeClr val="accent6">
+                        <a:lumMod val="40000"/>
+                        <a:lumOff val="60000"/>
+                      </a:schemeClr>
+                    </a:solidFill>
+                  </a:tcPr>
+                </a:tc>
+                <a:tc>
+                  <a:txBody>
+                    <a:bodyPr/>
+                    <a:lstStyle/>
+                    <a:p>
+                      <a:pPr algn="l"/>
+                      <a:r>
+                        <a:rPr lang="es-ES" sz="1000" dirty="0">
+                          <a:latin typeface="+mn-lt"/>
+                        </a:rPr>
+                        <a:t>Decisión final tomada por el analista</a:t>
+                      </a:r>
+                      <a:endParaRPr lang="es-CO" sz="1000" dirty="0">
+                        <a:latin typeface="+mn-lt"/>
+                      </a:endParaRPr>
+                    </a:p>
+                  </a:txBody>
+                  <a:tcPr>
+                    <a:solidFill>
+                      <a:schemeClr val="accent6">
+                        <a:lumMod val="40000"/>
+                        <a:lumOff val="60000"/>
+                      </a:schemeClr>
+                    </a:solidFill>
+                  </a:tcPr>
+                </a:tc>
+                <a:tc>
+                  <a:txBody>
+                    <a:bodyPr/>
+                    <a:lstStyle/>
+                    <a:p>
+                      <a:pPr algn="ctr"/>
+                      <a:r>
+                        <a:rPr lang="es-ES" sz="1000" dirty="0">
+                          <a:latin typeface="+mn-lt"/>
+                        </a:rPr>
+                        <a:t>1=Se toma una acción, 0=No hay acción</a:t>
+                      </a:r>
+                      <a:endParaRPr lang="es-CO" sz="1000" dirty="0">
+                        <a:latin typeface="+mn-lt"/>
+                      </a:endParaRPr>
+                    </a:p>
+                  </a:txBody>
+                  <a:tcPr>
+                    <a:solidFill>
+                      <a:schemeClr val="accent6">
+                        <a:lumMod val="40000"/>
+                        <a:lumOff val="60000"/>
+                      </a:schemeClr>
+                    </a:solidFill>
+                  </a:tcPr>
+                </a:tc>
+                <a:extLst>
+                  <a:ext uri="{0D108BD9-81ED-4DB2-BD59-A6C34878D82A}">
+                    <a16:rowId xmlns:a16="http://schemas.microsoft.com/office/drawing/2014/main" val="4010770208"/>
+                  </a:ext>
+                </a:extLst>
+              </a:tr>
             </a:tbl>
           </a:graphicData>
         </a:graphic>
@@ -23525,7 +21771,7 @@
 </p:sld>
 </file>
 
-<file path=ppt/slides/slide7.xml><?xml version="1.0" encoding="utf-8"?>
+<file path=ppt/slides/slide6.xml><?xml version="1.0" encoding="utf-8"?>
 <p:sld xmlns:a="http://schemas.openxmlformats.org/drawingml/2006/main" xmlns:r="http://schemas.openxmlformats.org/officeDocument/2006/relationships" xmlns:p="http://schemas.openxmlformats.org/presentationml/2006/main">
   <p:cSld>
     <p:spTree>
@@ -23810,7 +22056,7 @@
 </p:sld>
 </file>
 
-<file path=ppt/slides/slide8.xml><?xml version="1.0" encoding="utf-8"?>
+<file path=ppt/slides/slide7.xml><?xml version="1.0" encoding="utf-8"?>
 <p:sld xmlns:a="http://schemas.openxmlformats.org/drawingml/2006/main" xmlns:r="http://schemas.openxmlformats.org/officeDocument/2006/relationships" xmlns:p="http://schemas.openxmlformats.org/presentationml/2006/main">
   <p:cSld>
     <p:spTree>
@@ -23978,7 +22224,7 @@
 </p:sld>
 </file>
 
-<file path=ppt/slides/slide9.xml><?xml version="1.0" encoding="utf-8"?>
+<file path=ppt/slides/slide8.xml><?xml version="1.0" encoding="utf-8"?>
 <p:sld xmlns:a="http://schemas.openxmlformats.org/drawingml/2006/main" xmlns:r="http://schemas.openxmlformats.org/officeDocument/2006/relationships" xmlns:p="http://schemas.openxmlformats.org/presentationml/2006/main">
   <p:cSld>
     <p:spTree>
@@ -24243,6 +22489,547 @@
     <p:extLst>
       <p:ext uri="{BB962C8B-B14F-4D97-AF65-F5344CB8AC3E}">
         <p14:creationId xmlns:p14="http://schemas.microsoft.com/office/powerpoint/2010/main" val="4015246323"/>
+      </p:ext>
+    </p:extLst>
+  </p:cSld>
+  <p:clrMapOvr>
+    <a:masterClrMapping/>
+  </p:clrMapOvr>
+</p:sld>
+</file>
+
+<file path=ppt/slides/slide9.xml><?xml version="1.0" encoding="utf-8"?>
+<p:sld xmlns:a="http://schemas.openxmlformats.org/drawingml/2006/main" xmlns:r="http://schemas.openxmlformats.org/officeDocument/2006/relationships" xmlns:p="http://schemas.openxmlformats.org/presentationml/2006/main">
+  <p:cSld>
+    <p:spTree>
+      <p:nvGrpSpPr>
+        <p:cNvPr id="1" name=""/>
+        <p:cNvGrpSpPr/>
+        <p:nvPr/>
+      </p:nvGrpSpPr>
+      <p:grpSpPr>
+        <a:xfrm>
+          <a:off x="0" y="0"/>
+          <a:ext cx="0" cy="0"/>
+          <a:chOff x="0" y="0"/>
+          <a:chExt cx="0" cy="0"/>
+        </a:xfrm>
+      </p:grpSpPr>
+      <p:sp>
+        <p:nvSpPr>
+          <p:cNvPr id="2" name="Título 1">
+            <a:extLst>
+              <a:ext uri="{FF2B5EF4-FFF2-40B4-BE49-F238E27FC236}">
+                <a16:creationId xmlns:a16="http://schemas.microsoft.com/office/drawing/2014/main" id="{7F63C47A-318B-4D5D-0166-313320578154}"/>
+              </a:ext>
+            </a:extLst>
+          </p:cNvPr>
+          <p:cNvSpPr>
+            <a:spLocks noGrp="1"/>
+          </p:cNvSpPr>
+          <p:nvPr>
+            <p:ph type="ctrTitle"/>
+          </p:nvPr>
+        </p:nvSpPr>
+        <p:spPr>
+          <a:xfrm>
+            <a:off x="685800" y="761099"/>
+            <a:ext cx="7772400" cy="388840"/>
+          </a:xfrm>
+        </p:spPr>
+        <p:txBody>
+          <a:bodyPr>
+            <a:noAutofit/>
+          </a:bodyPr>
+          <a:lstStyle/>
+          <a:p>
+            <a:r>
+              <a:rPr lang="es-CO" sz="2800" b="1" dirty="0"/>
+              <a:t>Entrenamiento del modelo </a:t>
+            </a:r>
+            <a:r>
+              <a:rPr lang="es-CO" sz="2800" b="1" dirty="0" err="1">
+                <a:solidFill>
+                  <a:schemeClr val="tx1"/>
+                </a:solidFill>
+              </a:rPr>
+              <a:t>Random</a:t>
+            </a:r>
+            <a:r>
+              <a:rPr lang="es-CO" sz="2800" b="1" dirty="0">
+                <a:solidFill>
+                  <a:schemeClr val="tx1"/>
+                </a:solidFill>
+              </a:rPr>
+              <a:t> Forest</a:t>
+            </a:r>
+            <a:r>
+              <a:rPr lang="es-CO" sz="2800" b="1" dirty="0"/>
+              <a:t>.</a:t>
+            </a:r>
+          </a:p>
+        </p:txBody>
+      </p:sp>
+      <p:sp>
+        <p:nvSpPr>
+          <p:cNvPr id="3" name="Subtítulo 2">
+            <a:extLst>
+              <a:ext uri="{FF2B5EF4-FFF2-40B4-BE49-F238E27FC236}">
+                <a16:creationId xmlns:a16="http://schemas.microsoft.com/office/drawing/2014/main" id="{F4A8B6A1-7D37-A5AE-1FE4-497728A76C56}"/>
+              </a:ext>
+            </a:extLst>
+          </p:cNvPr>
+          <p:cNvSpPr>
+            <a:spLocks noGrp="1"/>
+          </p:cNvSpPr>
+          <p:nvPr>
+            <p:ph type="subTitle" idx="1"/>
+          </p:nvPr>
+        </p:nvSpPr>
+        <p:spPr>
+          <a:xfrm>
+            <a:off x="951722" y="1327778"/>
+            <a:ext cx="6820678" cy="4326574"/>
+          </a:xfrm>
+        </p:spPr>
+        <p:txBody>
+          <a:bodyPr>
+            <a:normAutofit/>
+          </a:bodyPr>
+          <a:lstStyle/>
+          <a:p>
+            <a:pPr algn="l"/>
+            <a:r>
+              <a:rPr lang="es-CO" sz="1400" dirty="0">
+                <a:solidFill>
+                  <a:schemeClr val="tx1"/>
+                </a:solidFill>
+              </a:rPr>
+              <a:t>70% datos de Train</a:t>
+            </a:r>
+          </a:p>
+          <a:p>
+            <a:pPr algn="l"/>
+            <a:r>
+              <a:rPr lang="es-CO" sz="1400" dirty="0">
+                <a:solidFill>
+                  <a:schemeClr val="tx1"/>
+                </a:solidFill>
+              </a:rPr>
+              <a:t>15% datos de Test</a:t>
+            </a:r>
+          </a:p>
+          <a:p>
+            <a:pPr algn="l"/>
+            <a:r>
+              <a:rPr lang="es-CO" sz="1400" dirty="0">
+                <a:solidFill>
+                  <a:schemeClr val="tx1"/>
+                </a:solidFill>
+              </a:rPr>
+              <a:t>15% datos de Validación</a:t>
+            </a:r>
+          </a:p>
+          <a:p>
+            <a:pPr algn="l"/>
+            <a:endParaRPr lang="es-CO" sz="1400" dirty="0">
+              <a:solidFill>
+                <a:schemeClr val="tx1"/>
+              </a:solidFill>
+            </a:endParaRPr>
+          </a:p>
+          <a:p>
+            <a:pPr algn="l"/>
+            <a:endParaRPr lang="es-CO" sz="1400" dirty="0">
+              <a:solidFill>
+                <a:schemeClr val="tx1"/>
+              </a:solidFill>
+            </a:endParaRPr>
+          </a:p>
+          <a:p>
+            <a:pPr algn="l"/>
+            <a:r>
+              <a:rPr lang="es-CO" sz="1400" dirty="0">
+                <a:solidFill>
+                  <a:schemeClr val="tx1"/>
+                </a:solidFill>
+              </a:rPr>
+              <a:t>Datos de Test</a:t>
+            </a:r>
+          </a:p>
+          <a:p>
+            <a:pPr algn="l"/>
+            <a:r>
+              <a:rPr lang="es-ES" sz="1400" dirty="0">
+                <a:solidFill>
+                  <a:schemeClr val="tx1"/>
+                </a:solidFill>
+              </a:rPr>
+              <a:t>- </a:t>
+            </a:r>
+            <a:r>
+              <a:rPr lang="es-ES" sz="1400" dirty="0" err="1">
+                <a:solidFill>
+                  <a:schemeClr val="tx1"/>
+                </a:solidFill>
+              </a:rPr>
+              <a:t>Accuracy</a:t>
+            </a:r>
+            <a:r>
+              <a:rPr lang="es-ES" sz="1400" dirty="0">
+                <a:solidFill>
+                  <a:schemeClr val="tx1"/>
+                </a:solidFill>
+              </a:rPr>
+              <a:t>: 85.26%</a:t>
+            </a:r>
+          </a:p>
+          <a:p>
+            <a:pPr algn="l"/>
+            <a:r>
+              <a:rPr lang="es-ES" sz="1400" dirty="0">
+                <a:solidFill>
+                  <a:schemeClr val="tx1"/>
+                </a:solidFill>
+              </a:rPr>
+              <a:t>- F1 Score: 88.94%</a:t>
+            </a:r>
+          </a:p>
+          <a:p>
+            <a:pPr algn="l"/>
+            <a:endParaRPr lang="es-ES" sz="1400" dirty="0">
+              <a:solidFill>
+                <a:schemeClr val="tx1"/>
+              </a:solidFill>
+            </a:endParaRPr>
+          </a:p>
+          <a:p>
+            <a:pPr algn="l"/>
+            <a:endParaRPr lang="es-ES" sz="1400" dirty="0">
+              <a:solidFill>
+                <a:schemeClr val="tx1"/>
+              </a:solidFill>
+            </a:endParaRPr>
+          </a:p>
+          <a:p>
+            <a:pPr algn="l"/>
+            <a:endParaRPr lang="es-ES" sz="1400" dirty="0">
+              <a:solidFill>
+                <a:schemeClr val="tx1"/>
+              </a:solidFill>
+            </a:endParaRPr>
+          </a:p>
+          <a:p>
+            <a:pPr algn="l"/>
+            <a:r>
+              <a:rPr lang="es-ES" sz="1400" dirty="0">
+                <a:solidFill>
+                  <a:schemeClr val="tx1"/>
+                </a:solidFill>
+              </a:rPr>
+              <a:t>Los resultados son positivos, especialmente en el F1 Score, que es la métrica más relevante en este caso por el desbalance moderado entre clases.</a:t>
+            </a:r>
+          </a:p>
+          <a:p>
+            <a:pPr algn="l"/>
+            <a:endParaRPr lang="es-ES" sz="1600" dirty="0">
+              <a:solidFill>
+                <a:schemeClr val="tx1"/>
+              </a:solidFill>
+            </a:endParaRPr>
+          </a:p>
+          <a:p>
+            <a:pPr algn="l"/>
+            <a:endParaRPr lang="es-CO" sz="1600" dirty="0">
+              <a:solidFill>
+                <a:schemeClr val="tx1"/>
+              </a:solidFill>
+            </a:endParaRPr>
+          </a:p>
+        </p:txBody>
+      </p:sp>
+      <p:pic>
+        <p:nvPicPr>
+          <p:cNvPr id="4" name="Picture 2" descr="Universidad de Medellín - Universidad de Medellín">
+            <a:extLst>
+              <a:ext uri="{FF2B5EF4-FFF2-40B4-BE49-F238E27FC236}">
+                <a16:creationId xmlns:a16="http://schemas.microsoft.com/office/drawing/2014/main" id="{55CFFF9E-3355-1C5B-5E6B-D4FD351B2F1C}"/>
+              </a:ext>
+            </a:extLst>
+          </p:cNvPr>
+          <p:cNvPicPr>
+            <a:picLocks noChangeAspect="1" noChangeArrowheads="1"/>
+          </p:cNvPicPr>
+          <p:nvPr/>
+        </p:nvPicPr>
+        <p:blipFill>
+          <a:blip r:embed="rId2">
+            <a:extLst>
+              <a:ext uri="{28A0092B-C50C-407E-A947-70E740481C1C}">
+                <a14:useLocalDpi xmlns:a14="http://schemas.microsoft.com/office/drawing/2010/main" val="0"/>
+              </a:ext>
+            </a:extLst>
+          </a:blip>
+          <a:srcRect/>
+          <a:stretch>
+            <a:fillRect/>
+          </a:stretch>
+        </p:blipFill>
+        <p:spPr bwMode="auto">
+          <a:xfrm>
+            <a:off x="1" y="1"/>
+            <a:ext cx="2136710" cy="761098"/>
+          </a:xfrm>
+          <a:prstGeom prst="rect">
+            <a:avLst/>
+          </a:prstGeom>
+          <a:noFill/>
+          <a:extLst>
+            <a:ext uri="{909E8E84-426E-40DD-AFC4-6F175D3DCCD1}">
+              <a14:hiddenFill xmlns:a14="http://schemas.microsoft.com/office/drawing/2010/main">
+                <a:solidFill>
+                  <a:srgbClr val="FFFFFF"/>
+                </a:solidFill>
+              </a14:hiddenFill>
+            </a:ext>
+          </a:extLst>
+        </p:spPr>
+      </p:pic>
+      <p:pic>
+        <p:nvPicPr>
+          <p:cNvPr id="6" name="Imagen 5">
+            <a:extLst>
+              <a:ext uri="{FF2B5EF4-FFF2-40B4-BE49-F238E27FC236}">
+                <a16:creationId xmlns:a16="http://schemas.microsoft.com/office/drawing/2014/main" id="{CBCFAF55-1E87-0658-B0A0-FB0F0AE34263}"/>
+              </a:ext>
+            </a:extLst>
+          </p:cNvPr>
+          <p:cNvPicPr>
+            <a:picLocks noChangeAspect="1"/>
+          </p:cNvPicPr>
+          <p:nvPr/>
+        </p:nvPicPr>
+        <p:blipFill>
+          <a:blip r:embed="rId3"/>
+          <a:stretch>
+            <a:fillRect/>
+          </a:stretch>
+        </p:blipFill>
+        <p:spPr>
+          <a:xfrm>
+            <a:off x="3396343" y="1327778"/>
+            <a:ext cx="4049486" cy="2659806"/>
+          </a:xfrm>
+          <a:prstGeom prst="rect">
+            <a:avLst/>
+          </a:prstGeom>
+        </p:spPr>
+      </p:pic>
+      <p:graphicFrame>
+        <p:nvGraphicFramePr>
+          <p:cNvPr id="7" name="Tabla 6">
+            <a:extLst>
+              <a:ext uri="{FF2B5EF4-FFF2-40B4-BE49-F238E27FC236}">
+                <a16:creationId xmlns:a16="http://schemas.microsoft.com/office/drawing/2014/main" id="{1F25265C-5805-DD36-4E0F-C1A26D69C82C}"/>
+              </a:ext>
+            </a:extLst>
+          </p:cNvPr>
+          <p:cNvGraphicFramePr>
+            <a:graphicFrameLocks noGrp="1"/>
+          </p:cNvGraphicFramePr>
+          <p:nvPr>
+            <p:extLst>
+              <p:ext uri="{D42A27DB-BD31-4B8C-83A1-F6EECF244321}">
+                <p14:modId xmlns:p14="http://schemas.microsoft.com/office/powerpoint/2010/main" val="3070534253"/>
+              </p:ext>
+            </p:extLst>
+          </p:nvPr>
+        </p:nvGraphicFramePr>
+        <p:xfrm>
+          <a:off x="1007705" y="4831392"/>
+          <a:ext cx="6596744" cy="822960"/>
+        </p:xfrm>
+        <a:graphic>
+          <a:graphicData uri="http://schemas.openxmlformats.org/drawingml/2006/table">
+            <a:tbl>
+              <a:tblPr firstRow="1" bandRow="1">
+                <a:tableStyleId>{5C22544A-7EE6-4342-B048-85BDC9FD1C3A}</a:tableStyleId>
+              </a:tblPr>
+              <a:tblGrid>
+                <a:gridCol w="1603312">
+                  <a:extLst>
+                    <a:ext uri="{9D8B030D-6E8A-4147-A177-3AD203B41FA5}">
+                      <a16:colId xmlns:a16="http://schemas.microsoft.com/office/drawing/2014/main" val="3359673869"/>
+                    </a:ext>
+                  </a:extLst>
+                </a:gridCol>
+                <a:gridCol w="2011108">
+                  <a:extLst>
+                    <a:ext uri="{9D8B030D-6E8A-4147-A177-3AD203B41FA5}">
+                      <a16:colId xmlns:a16="http://schemas.microsoft.com/office/drawing/2014/main" val="4013225091"/>
+                    </a:ext>
+                  </a:extLst>
+                </a:gridCol>
+                <a:gridCol w="2982324">
+                  <a:extLst>
+                    <a:ext uri="{9D8B030D-6E8A-4147-A177-3AD203B41FA5}">
+                      <a16:colId xmlns:a16="http://schemas.microsoft.com/office/drawing/2014/main" val="837407753"/>
+                    </a:ext>
+                  </a:extLst>
+                </a:gridCol>
+              </a:tblGrid>
+              <a:tr h="0">
+                <a:tc>
+                  <a:txBody>
+                    <a:bodyPr/>
+                    <a:lstStyle/>
+                    <a:p>
+                      <a:pPr algn="ctr"/>
+                      <a:endParaRPr lang="es-CO" sz="1200" dirty="0"/>
+                    </a:p>
+                  </a:txBody>
+                  <a:tcPr/>
+                </a:tc>
+                <a:tc>
+                  <a:txBody>
+                    <a:bodyPr/>
+                    <a:lstStyle/>
+                    <a:p>
+                      <a:pPr algn="ctr"/>
+                      <a:r>
+                        <a:rPr lang="es-CO" sz="1200" dirty="0"/>
+                        <a:t>Predicción: No acción (0)</a:t>
+                      </a:r>
+                    </a:p>
+                  </a:txBody>
+                  <a:tcPr/>
+                </a:tc>
+                <a:tc>
+                  <a:txBody>
+                    <a:bodyPr/>
+                    <a:lstStyle/>
+                    <a:p>
+                      <a:pPr algn="ctr"/>
+                      <a:r>
+                        <a:rPr lang="es-CO" sz="1200" dirty="0"/>
+                        <a:t>Predicción: Acción (1)</a:t>
+                      </a:r>
+                    </a:p>
+                  </a:txBody>
+                  <a:tcPr/>
+                </a:tc>
+                <a:extLst>
+                  <a:ext uri="{0D108BD9-81ED-4DB2-BD59-A6C34878D82A}">
+                    <a16:rowId xmlns:a16="http://schemas.microsoft.com/office/drawing/2014/main" val="2252421095"/>
+                  </a:ext>
+                </a:extLst>
+              </a:tr>
+              <a:tr h="152752">
+                <a:tc>
+                  <a:txBody>
+                    <a:bodyPr/>
+                    <a:lstStyle/>
+                    <a:p>
+                      <a:pPr algn="ctr"/>
+                      <a:r>
+                        <a:rPr lang="es-CO" sz="1200" dirty="0"/>
+                        <a:t>Analista: No acción (0)</a:t>
+                      </a:r>
+                    </a:p>
+                  </a:txBody>
+                  <a:tcPr/>
+                </a:tc>
+                <a:tc>
+                  <a:txBody>
+                    <a:bodyPr/>
+                    <a:lstStyle/>
+                    <a:p>
+                      <a:pPr algn="ctr"/>
+                      <a:r>
+                        <a:rPr lang="es-CO" sz="1200" dirty="0"/>
+                        <a:t>3,351 (verdaderos negativos)</a:t>
+                      </a:r>
+                    </a:p>
+                  </a:txBody>
+                  <a:tcPr/>
+                </a:tc>
+                <a:tc>
+                  <a:txBody>
+                    <a:bodyPr/>
+                    <a:lstStyle/>
+                    <a:p>
+                      <a:pPr algn="ctr"/>
+                      <a:r>
+                        <a:rPr lang="es-CO" sz="1200" dirty="0"/>
+                        <a:t>1,028 (falsos positivos)</a:t>
+                      </a:r>
+                    </a:p>
+                  </a:txBody>
+                  <a:tcPr/>
+                </a:tc>
+                <a:extLst>
+                  <a:ext uri="{0D108BD9-81ED-4DB2-BD59-A6C34878D82A}">
+                    <a16:rowId xmlns:a16="http://schemas.microsoft.com/office/drawing/2014/main" val="3913384185"/>
+                  </a:ext>
+                </a:extLst>
+              </a:tr>
+              <a:tr h="0">
+                <a:tc>
+                  <a:txBody>
+                    <a:bodyPr/>
+                    <a:lstStyle/>
+                    <a:p>
+                      <a:pPr algn="ctr"/>
+                      <a:r>
+                        <a:rPr lang="es-CO" sz="1200" dirty="0"/>
+                        <a:t>Analista: Acción (1)</a:t>
+                      </a:r>
+                    </a:p>
+                  </a:txBody>
+                  <a:tcPr/>
+                </a:tc>
+                <a:tc>
+                  <a:txBody>
+                    <a:bodyPr/>
+                    <a:lstStyle/>
+                    <a:p>
+                      <a:pPr algn="ctr"/>
+                      <a:r>
+                        <a:rPr lang="es-CO" sz="1200" dirty="0"/>
+                        <a:t>869 (falsos negativos)</a:t>
+                      </a:r>
+                    </a:p>
+                  </a:txBody>
+                  <a:tcPr/>
+                </a:tc>
+                <a:tc>
+                  <a:txBody>
+                    <a:bodyPr/>
+                    <a:lstStyle/>
+                    <a:p>
+                      <a:pPr algn="ctr"/>
+                      <a:r>
+                        <a:rPr lang="es-CO" sz="1200" dirty="0"/>
+                        <a:t>7,624 (verdaderos positivos)</a:t>
+                      </a:r>
+                    </a:p>
+                  </a:txBody>
+                  <a:tcPr/>
+                </a:tc>
+                <a:extLst>
+                  <a:ext uri="{0D108BD9-81ED-4DB2-BD59-A6C34878D82A}">
+                    <a16:rowId xmlns:a16="http://schemas.microsoft.com/office/drawing/2014/main" val="472616589"/>
+                  </a:ext>
+                </a:extLst>
+              </a:tr>
+            </a:tbl>
+          </a:graphicData>
+        </a:graphic>
+      </p:graphicFrame>
+    </p:spTree>
+    <p:extLst>
+      <p:ext uri="{BB962C8B-B14F-4D97-AF65-F5344CB8AC3E}">
+        <p14:creationId xmlns:p14="http://schemas.microsoft.com/office/powerpoint/2010/main" val="1155662811"/>
       </p:ext>
     </p:extLst>
   </p:cSld>

</xml_diff>